<commit_message>
Export Postman and change on the presentation
</commit_message>
<xml_diff>
--- a/docs/LSMSD_Presentation.pptx
+++ b/docs/LSMSD_Presentation.pptx
@@ -1742,6 +1742,76 @@
     </pc:docChg>
   </pc:docChgLst>
   <pc:docChgLst>
+    <pc:chgData name="Gabriele Silano" userId="S::g.silano@studenti.unipi.it::583ecce5-1896-4724-8d68-db413e846967" providerId="AD" clId="Web-{CB873A95-3FB4-4EBD-A867-6276B858300B}"/>
+    <pc:docChg chg="modSld">
+      <pc:chgData name="Gabriele Silano" userId="S::g.silano@studenti.unipi.it::583ecce5-1896-4724-8d68-db413e846967" providerId="AD" clId="Web-{CB873A95-3FB4-4EBD-A867-6276B858300B}" dt="2024-09-09T18:15:34.756" v="29" actId="20577"/>
+      <pc:docMkLst>
+        <pc:docMk/>
+      </pc:docMkLst>
+      <pc:sldChg chg="modSp">
+        <pc:chgData name="Gabriele Silano" userId="S::g.silano@studenti.unipi.it::583ecce5-1896-4724-8d68-db413e846967" providerId="AD" clId="Web-{CB873A95-3FB4-4EBD-A867-6276B858300B}" dt="2024-09-09T18:14:26.175" v="10" actId="20577"/>
+        <pc:sldMkLst>
+          <pc:docMk/>
+          <pc:sldMk cId="1793239490" sldId="268"/>
+        </pc:sldMkLst>
+        <pc:spChg chg="mod">
+          <ac:chgData name="Gabriele Silano" userId="S::g.silano@studenti.unipi.it::583ecce5-1896-4724-8d68-db413e846967" providerId="AD" clId="Web-{CB873A95-3FB4-4EBD-A867-6276B858300B}" dt="2024-09-09T18:14:19.550" v="8" actId="20577"/>
+          <ac:spMkLst>
+            <pc:docMk/>
+            <pc:sldMk cId="1793239490" sldId="268"/>
+            <ac:spMk id="14" creationId="{44DF1117-5A00-AD50-32B3-B1E423D1C224}"/>
+          </ac:spMkLst>
+        </pc:spChg>
+        <pc:spChg chg="mod">
+          <ac:chgData name="Gabriele Silano" userId="S::g.silano@studenti.unipi.it::583ecce5-1896-4724-8d68-db413e846967" providerId="AD" clId="Web-{CB873A95-3FB4-4EBD-A867-6276B858300B}" dt="2024-09-09T18:14:26.175" v="10" actId="20577"/>
+          <ac:spMkLst>
+            <pc:docMk/>
+            <pc:sldMk cId="1793239490" sldId="268"/>
+            <ac:spMk id="15" creationId="{7B5EDDAA-AE01-C067-FC95-35E9C3FCE2FB}"/>
+          </ac:spMkLst>
+        </pc:spChg>
+      </pc:sldChg>
+      <pc:sldChg chg="modSp">
+        <pc:chgData name="Gabriele Silano" userId="S::g.silano@studenti.unipi.it::583ecce5-1896-4724-8d68-db413e846967" providerId="AD" clId="Web-{CB873A95-3FB4-4EBD-A867-6276B858300B}" dt="2024-09-09T18:15:12.068" v="22" actId="1076"/>
+        <pc:sldMkLst>
+          <pc:docMk/>
+          <pc:sldMk cId="3910548362" sldId="271"/>
+        </pc:sldMkLst>
+        <pc:spChg chg="mod">
+          <ac:chgData name="Gabriele Silano" userId="S::g.silano@studenti.unipi.it::583ecce5-1896-4724-8d68-db413e846967" providerId="AD" clId="Web-{CB873A95-3FB4-4EBD-A867-6276B858300B}" dt="2024-09-09T18:15:12.068" v="22" actId="1076"/>
+          <ac:spMkLst>
+            <pc:docMk/>
+            <pc:sldMk cId="3910548362" sldId="271"/>
+            <ac:spMk id="2" creationId="{807D1E5F-9D7B-2E75-4E25-C9328489F3E5}"/>
+          </ac:spMkLst>
+        </pc:spChg>
+        <pc:spChg chg="mod">
+          <ac:chgData name="Gabriele Silano" userId="S::g.silano@studenti.unipi.it::583ecce5-1896-4724-8d68-db413e846967" providerId="AD" clId="Web-{CB873A95-3FB4-4EBD-A867-6276B858300B}" dt="2024-09-09T18:15:09.912" v="21" actId="1076"/>
+          <ac:spMkLst>
+            <pc:docMk/>
+            <pc:sldMk cId="3910548362" sldId="271"/>
+            <ac:spMk id="4" creationId="{9ADF5DC5-C68C-75DE-4565-DD6BB6138BCC}"/>
+          </ac:spMkLst>
+        </pc:spChg>
+      </pc:sldChg>
+      <pc:sldChg chg="modSp">
+        <pc:chgData name="Gabriele Silano" userId="S::g.silano@studenti.unipi.it::583ecce5-1896-4724-8d68-db413e846967" providerId="AD" clId="Web-{CB873A95-3FB4-4EBD-A867-6276B858300B}" dt="2024-09-09T18:15:34.756" v="29" actId="20577"/>
+        <pc:sldMkLst>
+          <pc:docMk/>
+          <pc:sldMk cId="2594366413" sldId="272"/>
+        </pc:sldMkLst>
+        <pc:spChg chg="mod">
+          <ac:chgData name="Gabriele Silano" userId="S::g.silano@studenti.unipi.it::583ecce5-1896-4724-8d68-db413e846967" providerId="AD" clId="Web-{CB873A95-3FB4-4EBD-A867-6276B858300B}" dt="2024-09-09T18:15:34.756" v="29" actId="20577"/>
+          <ac:spMkLst>
+            <pc:docMk/>
+            <pc:sldMk cId="2594366413" sldId="272"/>
+            <ac:spMk id="3" creationId="{8E519C60-04A0-F8C4-2DE1-C6B12FAD28C9}"/>
+          </ac:spMkLst>
+        </pc:spChg>
+      </pc:sldChg>
+    </pc:docChg>
+  </pc:docChgLst>
+  <pc:docChgLst>
     <pc:chgData name="Gabriele Silano" userId="S::g.silano@studenti.unipi.it::583ecce5-1896-4724-8d68-db413e846967" providerId="AD" clId="Web-{4D9DD04B-15C3-4608-B66B-45C6C402E964}"/>
     <pc:docChg chg="modSld">
       <pc:chgData name="Gabriele Silano" userId="S::g.silano@studenti.unipi.it::583ecce5-1896-4724-8d68-db413e846967" providerId="AD" clId="Web-{4D9DD04B-15C3-4608-B66B-45C6C402E964}" dt="2024-09-13T10:32:18.878" v="2" actId="1076"/>
@@ -1770,76 +1840,6 @@
             <ac:picMk id="16" creationId="{7C207705-A153-97D7-B307-8754EC94E1D3}"/>
           </ac:picMkLst>
         </pc:picChg>
-      </pc:sldChg>
-    </pc:docChg>
-  </pc:docChgLst>
-  <pc:docChgLst>
-    <pc:chgData name="Gabriele Silano" userId="S::g.silano@studenti.unipi.it::583ecce5-1896-4724-8d68-db413e846967" providerId="AD" clId="Web-{CB873A95-3FB4-4EBD-A867-6276B858300B}"/>
-    <pc:docChg chg="modSld">
-      <pc:chgData name="Gabriele Silano" userId="S::g.silano@studenti.unipi.it::583ecce5-1896-4724-8d68-db413e846967" providerId="AD" clId="Web-{CB873A95-3FB4-4EBD-A867-6276B858300B}" dt="2024-09-09T18:15:34.756" v="29" actId="20577"/>
-      <pc:docMkLst>
-        <pc:docMk/>
-      </pc:docMkLst>
-      <pc:sldChg chg="modSp">
-        <pc:chgData name="Gabriele Silano" userId="S::g.silano@studenti.unipi.it::583ecce5-1896-4724-8d68-db413e846967" providerId="AD" clId="Web-{CB873A95-3FB4-4EBD-A867-6276B858300B}" dt="2024-09-09T18:14:26.175" v="10" actId="20577"/>
-        <pc:sldMkLst>
-          <pc:docMk/>
-          <pc:sldMk cId="1793239490" sldId="268"/>
-        </pc:sldMkLst>
-        <pc:spChg chg="mod">
-          <ac:chgData name="Gabriele Silano" userId="S::g.silano@studenti.unipi.it::583ecce5-1896-4724-8d68-db413e846967" providerId="AD" clId="Web-{CB873A95-3FB4-4EBD-A867-6276B858300B}" dt="2024-09-09T18:14:19.550" v="8" actId="20577"/>
-          <ac:spMkLst>
-            <pc:docMk/>
-            <pc:sldMk cId="1793239490" sldId="268"/>
-            <ac:spMk id="14" creationId="{44DF1117-5A00-AD50-32B3-B1E423D1C224}"/>
-          </ac:spMkLst>
-        </pc:spChg>
-        <pc:spChg chg="mod">
-          <ac:chgData name="Gabriele Silano" userId="S::g.silano@studenti.unipi.it::583ecce5-1896-4724-8d68-db413e846967" providerId="AD" clId="Web-{CB873A95-3FB4-4EBD-A867-6276B858300B}" dt="2024-09-09T18:14:26.175" v="10" actId="20577"/>
-          <ac:spMkLst>
-            <pc:docMk/>
-            <pc:sldMk cId="1793239490" sldId="268"/>
-            <ac:spMk id="15" creationId="{7B5EDDAA-AE01-C067-FC95-35E9C3FCE2FB}"/>
-          </ac:spMkLst>
-        </pc:spChg>
-      </pc:sldChg>
-      <pc:sldChg chg="modSp">
-        <pc:chgData name="Gabriele Silano" userId="S::g.silano@studenti.unipi.it::583ecce5-1896-4724-8d68-db413e846967" providerId="AD" clId="Web-{CB873A95-3FB4-4EBD-A867-6276B858300B}" dt="2024-09-09T18:15:12.068" v="22" actId="1076"/>
-        <pc:sldMkLst>
-          <pc:docMk/>
-          <pc:sldMk cId="3910548362" sldId="271"/>
-        </pc:sldMkLst>
-        <pc:spChg chg="mod">
-          <ac:chgData name="Gabriele Silano" userId="S::g.silano@studenti.unipi.it::583ecce5-1896-4724-8d68-db413e846967" providerId="AD" clId="Web-{CB873A95-3FB4-4EBD-A867-6276B858300B}" dt="2024-09-09T18:15:12.068" v="22" actId="1076"/>
-          <ac:spMkLst>
-            <pc:docMk/>
-            <pc:sldMk cId="3910548362" sldId="271"/>
-            <ac:spMk id="2" creationId="{807D1E5F-9D7B-2E75-4E25-C9328489F3E5}"/>
-          </ac:spMkLst>
-        </pc:spChg>
-        <pc:spChg chg="mod">
-          <ac:chgData name="Gabriele Silano" userId="S::g.silano@studenti.unipi.it::583ecce5-1896-4724-8d68-db413e846967" providerId="AD" clId="Web-{CB873A95-3FB4-4EBD-A867-6276B858300B}" dt="2024-09-09T18:15:09.912" v="21" actId="1076"/>
-          <ac:spMkLst>
-            <pc:docMk/>
-            <pc:sldMk cId="3910548362" sldId="271"/>
-            <ac:spMk id="4" creationId="{9ADF5DC5-C68C-75DE-4565-DD6BB6138BCC}"/>
-          </ac:spMkLst>
-        </pc:spChg>
-      </pc:sldChg>
-      <pc:sldChg chg="modSp">
-        <pc:chgData name="Gabriele Silano" userId="S::g.silano@studenti.unipi.it::583ecce5-1896-4724-8d68-db413e846967" providerId="AD" clId="Web-{CB873A95-3FB4-4EBD-A867-6276B858300B}" dt="2024-09-09T18:15:34.756" v="29" actId="20577"/>
-        <pc:sldMkLst>
-          <pc:docMk/>
-          <pc:sldMk cId="2594366413" sldId="272"/>
-        </pc:sldMkLst>
-        <pc:spChg chg="mod">
-          <ac:chgData name="Gabriele Silano" userId="S::g.silano@studenti.unipi.it::583ecce5-1896-4724-8d68-db413e846967" providerId="AD" clId="Web-{CB873A95-3FB4-4EBD-A867-6276B858300B}" dt="2024-09-09T18:15:34.756" v="29" actId="20577"/>
-          <ac:spMkLst>
-            <pc:docMk/>
-            <pc:sldMk cId="2594366413" sldId="272"/>
-            <ac:spMk id="3" creationId="{8E519C60-04A0-F8C4-2DE1-C6B12FAD28C9}"/>
-          </ac:spMkLst>
-        </pc:spChg>
       </pc:sldChg>
     </pc:docChg>
   </pc:docChgLst>
@@ -2377,7 +2377,7 @@
           <a:p>
             <a:fld id="{2FDCBEE4-315A-8E42-835E-29A1DAE07625}" type="datetimeFigureOut">
               <a:rPr lang="it-IT" smtClean="0"/>
-              <a:t>13/09/2024</a:t>
+              <a:t>14/09/2024</a:t>
             </a:fld>
             <a:endParaRPr lang="it-IT"/>
           </a:p>
@@ -2435,7 +2435,7 @@
           <a:p>
             <a:fld id="{F3EAF9BD-73C2-C944-967F-16A9AD6CE362}" type="slidenum">
               <a:rPr lang="it-IT" smtClean="0"/>
-              <a:t>‹#›</a:t>
+              <a:t>‹N›</a:t>
             </a:fld>
             <a:endParaRPr lang="it-IT"/>
           </a:p>
@@ -2569,7 +2569,7 @@
           <a:p>
             <a:fld id="{2FDCBEE4-315A-8E42-835E-29A1DAE07625}" type="datetimeFigureOut">
               <a:rPr lang="it-IT" smtClean="0"/>
-              <a:t>13/09/2024</a:t>
+              <a:t>14/09/2024</a:t>
             </a:fld>
             <a:endParaRPr lang="it-IT"/>
           </a:p>
@@ -2627,7 +2627,7 @@
           <a:p>
             <a:fld id="{F3EAF9BD-73C2-C944-967F-16A9AD6CE362}" type="slidenum">
               <a:rPr lang="it-IT" smtClean="0"/>
-              <a:t>‹#›</a:t>
+              <a:t>‹N›</a:t>
             </a:fld>
             <a:endParaRPr lang="it-IT"/>
           </a:p>
@@ -2771,7 +2771,7 @@
           <a:p>
             <a:fld id="{2FDCBEE4-315A-8E42-835E-29A1DAE07625}" type="datetimeFigureOut">
               <a:rPr lang="it-IT" smtClean="0"/>
-              <a:t>13/09/2024</a:t>
+              <a:t>14/09/2024</a:t>
             </a:fld>
             <a:endParaRPr lang="it-IT"/>
           </a:p>
@@ -2829,7 +2829,7 @@
           <a:p>
             <a:fld id="{F3EAF9BD-73C2-C944-967F-16A9AD6CE362}" type="slidenum">
               <a:rPr lang="it-IT" smtClean="0"/>
-              <a:t>‹#›</a:t>
+              <a:t>‹N›</a:t>
             </a:fld>
             <a:endParaRPr lang="it-IT"/>
           </a:p>
@@ -2963,7 +2963,7 @@
           <a:p>
             <a:fld id="{2FDCBEE4-315A-8E42-835E-29A1DAE07625}" type="datetimeFigureOut">
               <a:rPr lang="it-IT" smtClean="0"/>
-              <a:t>13/09/2024</a:t>
+              <a:t>14/09/2024</a:t>
             </a:fld>
             <a:endParaRPr lang="it-IT"/>
           </a:p>
@@ -3021,7 +3021,7 @@
           <a:p>
             <a:fld id="{F3EAF9BD-73C2-C944-967F-16A9AD6CE362}" type="slidenum">
               <a:rPr lang="it-IT" smtClean="0"/>
-              <a:t>‹#›</a:t>
+              <a:t>‹N›</a:t>
             </a:fld>
             <a:endParaRPr lang="it-IT"/>
           </a:p>
@@ -3232,7 +3232,7 @@
           <a:p>
             <a:fld id="{2FDCBEE4-315A-8E42-835E-29A1DAE07625}" type="datetimeFigureOut">
               <a:rPr lang="it-IT" smtClean="0"/>
-              <a:t>13/09/2024</a:t>
+              <a:t>14/09/2024</a:t>
             </a:fld>
             <a:endParaRPr lang="it-IT"/>
           </a:p>
@@ -3290,7 +3290,7 @@
           <a:p>
             <a:fld id="{F3EAF9BD-73C2-C944-967F-16A9AD6CE362}" type="slidenum">
               <a:rPr lang="it-IT" smtClean="0"/>
-              <a:t>‹#›</a:t>
+              <a:t>‹N›</a:t>
             </a:fld>
             <a:endParaRPr lang="it-IT"/>
           </a:p>
@@ -3541,7 +3541,7 @@
           <a:p>
             <a:fld id="{2FDCBEE4-315A-8E42-835E-29A1DAE07625}" type="datetimeFigureOut">
               <a:rPr lang="it-IT" smtClean="0"/>
-              <a:t>13/09/2024</a:t>
+              <a:t>14/09/2024</a:t>
             </a:fld>
             <a:endParaRPr lang="it-IT"/>
           </a:p>
@@ -3599,7 +3599,7 @@
           <a:p>
             <a:fld id="{F3EAF9BD-73C2-C944-967F-16A9AD6CE362}" type="slidenum">
               <a:rPr lang="it-IT" smtClean="0"/>
-              <a:t>‹#›</a:t>
+              <a:t>‹N›</a:t>
             </a:fld>
             <a:endParaRPr lang="it-IT"/>
           </a:p>
@@ -3984,7 +3984,7 @@
           <a:p>
             <a:fld id="{2FDCBEE4-315A-8E42-835E-29A1DAE07625}" type="datetimeFigureOut">
               <a:rPr lang="it-IT" smtClean="0"/>
-              <a:t>13/09/2024</a:t>
+              <a:t>14/09/2024</a:t>
             </a:fld>
             <a:endParaRPr lang="it-IT"/>
           </a:p>
@@ -4042,7 +4042,7 @@
           <a:p>
             <a:fld id="{F3EAF9BD-73C2-C944-967F-16A9AD6CE362}" type="slidenum">
               <a:rPr lang="it-IT" smtClean="0"/>
-              <a:t>‹#›</a:t>
+              <a:t>‹N›</a:t>
             </a:fld>
             <a:endParaRPr lang="it-IT"/>
           </a:p>
@@ -4125,7 +4125,7 @@
           <a:p>
             <a:fld id="{2FDCBEE4-315A-8E42-835E-29A1DAE07625}" type="datetimeFigureOut">
               <a:rPr lang="it-IT" smtClean="0"/>
-              <a:t>13/09/2024</a:t>
+              <a:t>14/09/2024</a:t>
             </a:fld>
             <a:endParaRPr lang="it-IT"/>
           </a:p>
@@ -4183,7 +4183,7 @@
           <a:p>
             <a:fld id="{F3EAF9BD-73C2-C944-967F-16A9AD6CE362}" type="slidenum">
               <a:rPr lang="it-IT" smtClean="0"/>
-              <a:t>‹#›</a:t>
+              <a:t>‹N›</a:t>
             </a:fld>
             <a:endParaRPr lang="it-IT"/>
           </a:p>
@@ -4244,7 +4244,7 @@
           <a:p>
             <a:fld id="{2FDCBEE4-315A-8E42-835E-29A1DAE07625}" type="datetimeFigureOut">
               <a:rPr lang="it-IT" smtClean="0"/>
-              <a:t>13/09/2024</a:t>
+              <a:t>14/09/2024</a:t>
             </a:fld>
             <a:endParaRPr lang="it-IT"/>
           </a:p>
@@ -4302,7 +4302,7 @@
           <a:p>
             <a:fld id="{F3EAF9BD-73C2-C944-967F-16A9AD6CE362}" type="slidenum">
               <a:rPr lang="it-IT" smtClean="0"/>
-              <a:t>‹#›</a:t>
+              <a:t>‹N›</a:t>
             </a:fld>
             <a:endParaRPr lang="it-IT"/>
           </a:p>
@@ -4543,7 +4543,7 @@
           <a:p>
             <a:fld id="{2FDCBEE4-315A-8E42-835E-29A1DAE07625}" type="datetimeFigureOut">
               <a:rPr lang="it-IT" smtClean="0"/>
-              <a:t>13/09/2024</a:t>
+              <a:t>14/09/2024</a:t>
             </a:fld>
             <a:endParaRPr lang="it-IT"/>
           </a:p>
@@ -4601,7 +4601,7 @@
           <a:p>
             <a:fld id="{F3EAF9BD-73C2-C944-967F-16A9AD6CE362}" type="slidenum">
               <a:rPr lang="it-IT" smtClean="0"/>
-              <a:t>‹#›</a:t>
+              <a:t>‹N›</a:t>
             </a:fld>
             <a:endParaRPr lang="it-IT"/>
           </a:p>
@@ -4819,7 +4819,7 @@
           <a:p>
             <a:fld id="{2FDCBEE4-315A-8E42-835E-29A1DAE07625}" type="datetimeFigureOut">
               <a:rPr lang="it-IT" smtClean="0"/>
-              <a:t>13/09/2024</a:t>
+              <a:t>14/09/2024</a:t>
             </a:fld>
             <a:endParaRPr lang="it-IT"/>
           </a:p>
@@ -4877,7 +4877,7 @@
           <a:p>
             <a:fld id="{F3EAF9BD-73C2-C944-967F-16A9AD6CE362}" type="slidenum">
               <a:rPr lang="it-IT" smtClean="0"/>
-              <a:t>‹#›</a:t>
+              <a:t>‹N›</a:t>
             </a:fld>
             <a:endParaRPr lang="it-IT"/>
           </a:p>
@@ -11985,7 +11985,7 @@
         <p:spPr>
           <a:xfrm>
             <a:off x="168233" y="1444831"/>
-            <a:ext cx="7323115" cy="4524315"/>
+            <a:ext cx="7323115" cy="3970318"/>
           </a:xfrm>
           <a:prstGeom prst="rect">
             <a:avLst/>
@@ -12002,12 +12002,211 @@
           <a:lstStyle/>
           <a:p>
             <a:r>
-              <a:rPr lang="it-IT" b="1">
+              <a:rPr lang="it-IT" b="1" dirty="0">
                 <a:latin typeface="Arial"/>
                 <a:ea typeface="+mn-lt"/>
                 <a:cs typeface="+mn-lt"/>
               </a:rPr>
               <a:t>MONGODBGG</a:t>
+            </a:r>
+            <a:r>
+              <a:rPr lang="it-IT" dirty="0">
+                <a:latin typeface="Arial"/>
+                <a:ea typeface="+mn-lt"/>
+                <a:cs typeface="+mn-lt"/>
+              </a:rPr>
+              <a:t> </a:t>
+            </a:r>
+            <a:r>
+              <a:rPr lang="it-IT" dirty="0" err="1">
+                <a:latin typeface="Arial"/>
+                <a:ea typeface="+mn-lt"/>
+                <a:cs typeface="+mn-lt"/>
+              </a:rPr>
+              <a:t>is</a:t>
+            </a:r>
+            <a:r>
+              <a:rPr lang="it-IT" dirty="0">
+                <a:latin typeface="Arial"/>
+                <a:ea typeface="+mn-lt"/>
+                <a:cs typeface="+mn-lt"/>
+              </a:rPr>
+              <a:t> an </a:t>
+            </a:r>
+            <a:r>
+              <a:rPr lang="it-IT" dirty="0" err="1">
+                <a:latin typeface="Arial"/>
+                <a:ea typeface="+mn-lt"/>
+                <a:cs typeface="+mn-lt"/>
+              </a:rPr>
+              <a:t>application</a:t>
+            </a:r>
+            <a:r>
+              <a:rPr lang="it-IT" dirty="0">
+                <a:latin typeface="Arial"/>
+                <a:ea typeface="+mn-lt"/>
+                <a:cs typeface="+mn-lt"/>
+              </a:rPr>
+              <a:t> </a:t>
+            </a:r>
+            <a:r>
+              <a:rPr lang="it-IT" dirty="0" err="1">
+                <a:latin typeface="Arial"/>
+                <a:ea typeface="+mn-lt"/>
+                <a:cs typeface="+mn-lt"/>
+              </a:rPr>
+              <a:t>developed</a:t>
+            </a:r>
+            <a:r>
+              <a:rPr lang="it-IT" dirty="0">
+                <a:latin typeface="Arial"/>
+                <a:ea typeface="+mn-lt"/>
+                <a:cs typeface="+mn-lt"/>
+              </a:rPr>
+              <a:t> for </a:t>
+            </a:r>
+            <a:r>
+              <a:rPr lang="it-IT" dirty="0" err="1">
+                <a:latin typeface="Arial"/>
+                <a:ea typeface="+mn-lt"/>
+                <a:cs typeface="+mn-lt"/>
+              </a:rPr>
+              <a:t>managing</a:t>
+            </a:r>
+            <a:r>
+              <a:rPr lang="it-IT" dirty="0">
+                <a:latin typeface="Arial"/>
+                <a:ea typeface="+mn-lt"/>
+                <a:cs typeface="+mn-lt"/>
+              </a:rPr>
+              <a:t> and </a:t>
+            </a:r>
+            <a:r>
+              <a:rPr lang="it-IT" dirty="0" err="1">
+                <a:latin typeface="Arial"/>
+                <a:ea typeface="+mn-lt"/>
+                <a:cs typeface="+mn-lt"/>
+              </a:rPr>
+              <a:t>exploring</a:t>
+            </a:r>
+            <a:r>
+              <a:rPr lang="it-IT" dirty="0">
+                <a:latin typeface="Arial"/>
+                <a:ea typeface="+mn-lt"/>
+                <a:cs typeface="+mn-lt"/>
+              </a:rPr>
+              <a:t> board games.</a:t>
+            </a:r>
+            <a:endParaRPr lang="it-IT" dirty="0">
+              <a:latin typeface="Arial"/>
+              <a:ea typeface="Calibri"/>
+              <a:cs typeface="Calibri"/>
+            </a:endParaRPr>
+          </a:p>
+          <a:p>
+            <a:r>
+              <a:rPr lang="it-IT" dirty="0" err="1">
+                <a:latin typeface="Arial"/>
+                <a:ea typeface="+mn-lt"/>
+                <a:cs typeface="+mn-lt"/>
+              </a:rPr>
+              <a:t>Its</a:t>
+            </a:r>
+            <a:r>
+              <a:rPr lang="it-IT" dirty="0">
+                <a:latin typeface="Arial"/>
+                <a:ea typeface="+mn-lt"/>
+                <a:cs typeface="+mn-lt"/>
+              </a:rPr>
+              <a:t> core </a:t>
+            </a:r>
+            <a:r>
+              <a:rPr lang="it-IT" dirty="0" err="1">
+                <a:latin typeface="Arial"/>
+                <a:ea typeface="+mn-lt"/>
+                <a:cs typeface="+mn-lt"/>
+              </a:rPr>
+              <a:t>functionalities</a:t>
+            </a:r>
+            <a:r>
+              <a:rPr lang="it-IT" dirty="0">
+                <a:latin typeface="Arial"/>
+                <a:ea typeface="+mn-lt"/>
+                <a:cs typeface="+mn-lt"/>
+              </a:rPr>
+              <a:t> include </a:t>
+            </a:r>
+            <a:r>
+              <a:rPr lang="it-IT" dirty="0" err="1">
+                <a:latin typeface="Arial"/>
+                <a:ea typeface="+mn-lt"/>
+                <a:cs typeface="+mn-lt"/>
+              </a:rPr>
+              <a:t>presenting</a:t>
+            </a:r>
+            <a:r>
+              <a:rPr lang="it-IT" dirty="0">
+                <a:latin typeface="Arial"/>
+                <a:ea typeface="+mn-lt"/>
+                <a:cs typeface="+mn-lt"/>
+              </a:rPr>
+              <a:t> </a:t>
+            </a:r>
+            <a:r>
+              <a:rPr lang="it-IT" dirty="0" err="1">
+                <a:latin typeface="Arial"/>
+                <a:ea typeface="+mn-lt"/>
+                <a:cs typeface="+mn-lt"/>
+              </a:rPr>
+              <a:t>detailed</a:t>
+            </a:r>
+            <a:r>
+              <a:rPr lang="it-IT" dirty="0">
+                <a:latin typeface="Arial"/>
+                <a:ea typeface="+mn-lt"/>
+                <a:cs typeface="+mn-lt"/>
+              </a:rPr>
+              <a:t> information </a:t>
+            </a:r>
+            <a:r>
+              <a:rPr lang="it-IT" dirty="0" err="1">
+                <a:latin typeface="Arial"/>
+                <a:ea typeface="+mn-lt"/>
+                <a:cs typeface="+mn-lt"/>
+              </a:rPr>
+              <a:t>about</a:t>
+            </a:r>
+            <a:r>
+              <a:rPr lang="it-IT" dirty="0">
+                <a:latin typeface="Arial"/>
+                <a:ea typeface="+mn-lt"/>
+                <a:cs typeface="+mn-lt"/>
+              </a:rPr>
+              <a:t> </a:t>
+            </a:r>
+            <a:r>
+              <a:rPr lang="it-IT" dirty="0" err="1">
+                <a:latin typeface="Arial"/>
+                <a:ea typeface="+mn-lt"/>
+                <a:cs typeface="+mn-lt"/>
+              </a:rPr>
+              <a:t>various</a:t>
+            </a:r>
+            <a:r>
+              <a:rPr lang="it-IT" dirty="0">
+                <a:latin typeface="Arial"/>
+                <a:ea typeface="+mn-lt"/>
+                <a:cs typeface="+mn-lt"/>
+              </a:rPr>
+              <a:t> board games, writing reviews, and following </a:t>
+            </a:r>
+            <a:r>
+              <a:rPr lang="it-IT" dirty="0" err="1">
+                <a:latin typeface="Arial"/>
+                <a:ea typeface="+mn-lt"/>
+                <a:cs typeface="+mn-lt"/>
+              </a:rPr>
+              <a:t>other</a:t>
             </a:r>
             <a:r>
               <a:rPr lang="it-IT">
@@ -12015,290 +12214,52 @@
                 <a:ea typeface="+mn-lt"/>
                 <a:cs typeface="+mn-lt"/>
               </a:rPr>
-              <a:t> </a:t>
-            </a:r>
-            <a:r>
-              <a:rPr lang="it-IT" err="1">
+              <a:t> users.</a:t>
+            </a:r>
+            <a:endParaRPr lang="it-IT" dirty="0">
+              <a:latin typeface="Arial"/>
+              <a:ea typeface="+mn-lt"/>
+              <a:cs typeface="+mn-lt"/>
+            </a:endParaRPr>
+          </a:p>
+          <a:p>
+            <a:r>
+              <a:rPr lang="it-IT" dirty="0">
                 <a:latin typeface="Arial"/>
                 <a:ea typeface="+mn-lt"/>
                 <a:cs typeface="+mn-lt"/>
               </a:rPr>
-              <a:t>is</a:t>
-            </a:r>
-            <a:r>
-              <a:rPr lang="it-IT">
+              <a:t>The app </a:t>
+            </a:r>
+            <a:r>
+              <a:rPr lang="it-IT" dirty="0" err="1">
                 <a:latin typeface="Arial"/>
                 <a:ea typeface="+mn-lt"/>
                 <a:cs typeface="+mn-lt"/>
               </a:rPr>
-              <a:t> an </a:t>
-            </a:r>
-            <a:r>
-              <a:rPr lang="it-IT" err="1">
+              <a:t>allows</a:t>
+            </a:r>
+            <a:r>
+              <a:rPr lang="it-IT" dirty="0">
                 <a:latin typeface="Arial"/>
                 <a:ea typeface="+mn-lt"/>
                 <a:cs typeface="+mn-lt"/>
               </a:rPr>
-              <a:t>application</a:t>
-            </a:r>
-            <a:r>
-              <a:rPr lang="it-IT">
-                <a:latin typeface="Arial"/>
-                <a:ea typeface="+mn-lt"/>
-                <a:cs typeface="+mn-lt"/>
-              </a:rPr>
-              <a:t> </a:t>
-            </a:r>
-            <a:r>
-              <a:rPr lang="it-IT" err="1">
-                <a:latin typeface="Arial"/>
-                <a:ea typeface="+mn-lt"/>
-                <a:cs typeface="+mn-lt"/>
-              </a:rPr>
-              <a:t>developed</a:t>
-            </a:r>
-            <a:r>
-              <a:rPr lang="it-IT">
-                <a:latin typeface="Arial"/>
-                <a:ea typeface="+mn-lt"/>
-                <a:cs typeface="+mn-lt"/>
-              </a:rPr>
-              <a:t> for </a:t>
-            </a:r>
-            <a:r>
-              <a:rPr lang="it-IT" err="1">
-                <a:latin typeface="Arial"/>
-                <a:ea typeface="+mn-lt"/>
-                <a:cs typeface="+mn-lt"/>
-              </a:rPr>
-              <a:t>managing</a:t>
-            </a:r>
-            <a:r>
-              <a:rPr lang="it-IT">
-                <a:latin typeface="Arial"/>
-                <a:ea typeface="+mn-lt"/>
-                <a:cs typeface="+mn-lt"/>
-              </a:rPr>
-              <a:t> and </a:t>
-            </a:r>
-            <a:r>
-              <a:rPr lang="it-IT" err="1">
-                <a:latin typeface="Arial"/>
-                <a:ea typeface="+mn-lt"/>
-                <a:cs typeface="+mn-lt"/>
-              </a:rPr>
-              <a:t>exploring</a:t>
-            </a:r>
-            <a:r>
-              <a:rPr lang="it-IT">
-                <a:latin typeface="Arial"/>
-                <a:ea typeface="+mn-lt"/>
-                <a:cs typeface="+mn-lt"/>
-              </a:rPr>
-              <a:t> board games.</a:t>
-            </a:r>
-            <a:endParaRPr lang="it-IT">
+              <a:t> users to:</a:t>
+            </a:r>
+            <a:endParaRPr lang="it-IT" dirty="0">
               <a:latin typeface="Arial"/>
               <a:ea typeface="Calibri"/>
               <a:cs typeface="Calibri"/>
             </a:endParaRPr>
           </a:p>
           <a:p>
-            <a:r>
-              <a:rPr lang="it-IT" err="1">
-                <a:latin typeface="Arial"/>
-                <a:ea typeface="+mn-lt"/>
-                <a:cs typeface="+mn-lt"/>
-              </a:rPr>
-              <a:t>Its</a:t>
-            </a:r>
-            <a:r>
-              <a:rPr lang="it-IT">
-                <a:latin typeface="Arial"/>
-                <a:ea typeface="+mn-lt"/>
-                <a:cs typeface="+mn-lt"/>
-              </a:rPr>
-              <a:t> core </a:t>
-            </a:r>
-            <a:r>
-              <a:rPr lang="it-IT" err="1">
-                <a:latin typeface="Arial"/>
-                <a:ea typeface="+mn-lt"/>
-                <a:cs typeface="+mn-lt"/>
-              </a:rPr>
-              <a:t>functionalities</a:t>
-            </a:r>
-            <a:r>
-              <a:rPr lang="it-IT">
-                <a:latin typeface="Arial"/>
-                <a:ea typeface="+mn-lt"/>
-                <a:cs typeface="+mn-lt"/>
-              </a:rPr>
-              <a:t> include </a:t>
-            </a:r>
-            <a:r>
-              <a:rPr lang="it-IT" err="1">
-                <a:latin typeface="Arial"/>
-                <a:ea typeface="+mn-lt"/>
-                <a:cs typeface="+mn-lt"/>
-              </a:rPr>
-              <a:t>presenting</a:t>
-            </a:r>
-            <a:r>
-              <a:rPr lang="it-IT">
-                <a:latin typeface="Arial"/>
-                <a:ea typeface="+mn-lt"/>
-                <a:cs typeface="+mn-lt"/>
-              </a:rPr>
-              <a:t> </a:t>
-            </a:r>
-            <a:r>
-              <a:rPr lang="it-IT" err="1">
-                <a:latin typeface="Arial"/>
-                <a:ea typeface="+mn-lt"/>
-                <a:cs typeface="+mn-lt"/>
-              </a:rPr>
-              <a:t>detailed</a:t>
-            </a:r>
-            <a:r>
-              <a:rPr lang="it-IT">
-                <a:latin typeface="Arial"/>
-                <a:ea typeface="+mn-lt"/>
-                <a:cs typeface="+mn-lt"/>
-              </a:rPr>
-              <a:t> information </a:t>
-            </a:r>
-            <a:r>
-              <a:rPr lang="it-IT" err="1">
-                <a:latin typeface="Arial"/>
-                <a:ea typeface="+mn-lt"/>
-                <a:cs typeface="+mn-lt"/>
-              </a:rPr>
-              <a:t>about</a:t>
-            </a:r>
-            <a:r>
-              <a:rPr lang="it-IT">
-                <a:latin typeface="Arial"/>
-                <a:ea typeface="+mn-lt"/>
-                <a:cs typeface="+mn-lt"/>
-              </a:rPr>
-              <a:t> </a:t>
-            </a:r>
-            <a:r>
-              <a:rPr lang="it-IT" err="1">
-                <a:latin typeface="Arial"/>
-                <a:ea typeface="+mn-lt"/>
-                <a:cs typeface="+mn-lt"/>
-              </a:rPr>
-              <a:t>various</a:t>
-            </a:r>
-            <a:r>
-              <a:rPr lang="it-IT">
-                <a:latin typeface="Arial"/>
-                <a:ea typeface="+mn-lt"/>
-                <a:cs typeface="+mn-lt"/>
-              </a:rPr>
-              <a:t> board games, writing reviews, and following </a:t>
-            </a:r>
-            <a:r>
-              <a:rPr lang="it-IT" err="1">
-                <a:latin typeface="Arial"/>
-                <a:ea typeface="+mn-lt"/>
-                <a:cs typeface="+mn-lt"/>
-              </a:rPr>
-              <a:t>other</a:t>
-            </a:r>
-            <a:r>
-              <a:rPr lang="it-IT">
-                <a:latin typeface="Arial"/>
-                <a:ea typeface="+mn-lt"/>
-                <a:cs typeface="+mn-lt"/>
-              </a:rPr>
-              <a:t> users to </a:t>
-            </a:r>
-            <a:r>
-              <a:rPr lang="it-IT" err="1">
-                <a:latin typeface="Arial"/>
-                <a:ea typeface="+mn-lt"/>
-                <a:cs typeface="+mn-lt"/>
-              </a:rPr>
-              <a:t>view</a:t>
-            </a:r>
-            <a:r>
-              <a:rPr lang="it-IT">
-                <a:latin typeface="Arial"/>
-                <a:ea typeface="+mn-lt"/>
-                <a:cs typeface="+mn-lt"/>
-              </a:rPr>
-              <a:t> </a:t>
-            </a:r>
-            <a:r>
-              <a:rPr lang="it-IT" err="1">
-                <a:latin typeface="Arial"/>
-                <a:ea typeface="+mn-lt"/>
-                <a:cs typeface="+mn-lt"/>
-              </a:rPr>
-              <a:t>their</a:t>
-            </a:r>
-            <a:r>
-              <a:rPr lang="it-IT">
-                <a:latin typeface="Arial"/>
-                <a:ea typeface="+mn-lt"/>
-                <a:cs typeface="+mn-lt"/>
-              </a:rPr>
-              <a:t> activities and interactions.</a:t>
-            </a:r>
-            <a:endParaRPr lang="it-IT">
-              <a:latin typeface="Arial"/>
-              <a:ea typeface="Calibri"/>
-              <a:cs typeface="Calibri"/>
-            </a:endParaRPr>
-          </a:p>
-          <a:p>
-            <a:endParaRPr lang="it-IT">
-              <a:latin typeface="Arial"/>
-              <a:ea typeface="+mn-lt"/>
-              <a:cs typeface="+mn-lt"/>
-            </a:endParaRPr>
-          </a:p>
-          <a:p>
-            <a:r>
-              <a:rPr lang="it-IT">
-                <a:latin typeface="Arial"/>
-                <a:ea typeface="+mn-lt"/>
-                <a:cs typeface="+mn-lt"/>
-              </a:rPr>
-              <a:t>The app </a:t>
-            </a:r>
-            <a:r>
-              <a:rPr lang="it-IT" err="1">
-                <a:latin typeface="Arial"/>
-                <a:ea typeface="+mn-lt"/>
-                <a:cs typeface="+mn-lt"/>
-              </a:rPr>
-              <a:t>allows</a:t>
-            </a:r>
-            <a:r>
-              <a:rPr lang="it-IT">
-                <a:latin typeface="Arial"/>
-                <a:ea typeface="+mn-lt"/>
-                <a:cs typeface="+mn-lt"/>
-              </a:rPr>
-              <a:t> users to:</a:t>
-            </a:r>
-            <a:endParaRPr lang="it-IT">
-              <a:latin typeface="Arial"/>
-              <a:ea typeface="Calibri"/>
-              <a:cs typeface="Calibri"/>
-            </a:endParaRPr>
-          </a:p>
-          <a:p>
             <a:pPr marL="285750" indent="-285750">
               <a:buFont typeface="Arial"/>
               <a:buChar char="•"/>
             </a:pPr>
             <a:r>
-              <a:rPr lang="it-IT" b="1" err="1">
+              <a:rPr lang="it-IT" b="1" dirty="0" err="1">
                 <a:latin typeface="Arial"/>
                 <a:ea typeface="+mn-lt"/>
                 <a:cs typeface="+mn-lt"/>
@@ -12306,7 +12267,7 @@
               <a:t>Search</a:t>
             </a:r>
             <a:r>
-              <a:rPr lang="it-IT" b="1">
+              <a:rPr lang="it-IT" b="1" dirty="0">
                 <a:latin typeface="Arial"/>
                 <a:ea typeface="+mn-lt"/>
                 <a:cs typeface="+mn-lt"/>
@@ -12314,7 +12275,7 @@
               <a:t> and filter</a:t>
             </a:r>
             <a:r>
-              <a:rPr lang="it-IT">
+              <a:rPr lang="it-IT" dirty="0">
                 <a:latin typeface="Arial"/>
                 <a:ea typeface="+mn-lt"/>
                 <a:cs typeface="+mn-lt"/>
@@ -12322,7 +12283,7 @@
               <a:t> games </a:t>
             </a:r>
             <a:r>
-              <a:rPr lang="it-IT" err="1">
+              <a:rPr lang="it-IT" dirty="0" err="1">
                 <a:latin typeface="Arial"/>
                 <a:ea typeface="+mn-lt"/>
                 <a:cs typeface="+mn-lt"/>
@@ -12330,7 +12291,7 @@
               <a:t>based</a:t>
             </a:r>
             <a:r>
-              <a:rPr lang="it-IT">
+              <a:rPr lang="it-IT" dirty="0">
                 <a:latin typeface="Arial"/>
                 <a:ea typeface="+mn-lt"/>
                 <a:cs typeface="+mn-lt"/>
@@ -12338,7 +12299,7 @@
               <a:t> on name, </a:t>
             </a:r>
             <a:r>
-              <a:rPr lang="it-IT" err="1">
+              <a:rPr lang="it-IT" dirty="0" err="1">
                 <a:latin typeface="Arial"/>
                 <a:ea typeface="+mn-lt"/>
                 <a:cs typeface="+mn-lt"/>
@@ -12346,7 +12307,7 @@
               <a:t>categories</a:t>
             </a:r>
             <a:r>
-              <a:rPr lang="it-IT">
+              <a:rPr lang="it-IT" dirty="0">
                 <a:latin typeface="Arial"/>
                 <a:ea typeface="+mn-lt"/>
                 <a:cs typeface="+mn-lt"/>
@@ -12354,7 +12315,7 @@
               <a:t>, </a:t>
             </a:r>
             <a:r>
-              <a:rPr lang="it-IT" err="1">
+              <a:rPr lang="it-IT" dirty="0" err="1">
                 <a:latin typeface="Arial"/>
                 <a:ea typeface="+mn-lt"/>
                 <a:cs typeface="+mn-lt"/>
@@ -12362,14 +12323,14 @@
               <a:t>mechanics</a:t>
             </a:r>
             <a:r>
-              <a:rPr lang="it-IT">
+              <a:rPr lang="it-IT" dirty="0">
                 <a:latin typeface="Arial"/>
                 <a:ea typeface="+mn-lt"/>
                 <a:cs typeface="+mn-lt"/>
               </a:rPr>
               <a:t>, and ratings.</a:t>
             </a:r>
-            <a:endParaRPr lang="it-IT">
+            <a:endParaRPr lang="it-IT" dirty="0">
               <a:latin typeface="Arial"/>
               <a:cs typeface="Arial"/>
             </a:endParaRPr>
@@ -12380,7 +12341,7 @@
               <a:buChar char="•"/>
             </a:pPr>
             <a:r>
-              <a:rPr lang="it-IT" b="1">
+              <a:rPr lang="it-IT" b="1" dirty="0">
                 <a:latin typeface="Arial"/>
                 <a:ea typeface="+mn-lt"/>
                 <a:cs typeface="+mn-lt"/>
@@ -12388,7 +12349,7 @@
               <a:t>Write reviews</a:t>
             </a:r>
             <a:r>
-              <a:rPr lang="it-IT">
+              <a:rPr lang="it-IT" dirty="0">
                 <a:latin typeface="Arial"/>
                 <a:ea typeface="+mn-lt"/>
                 <a:cs typeface="+mn-lt"/>
@@ -12396,7 +12357,7 @@
               <a:t> with </a:t>
             </a:r>
             <a:r>
-              <a:rPr lang="it-IT" err="1">
+              <a:rPr lang="it-IT" dirty="0" err="1">
                 <a:latin typeface="Arial"/>
                 <a:ea typeface="+mn-lt"/>
                 <a:cs typeface="+mn-lt"/>
@@ -12404,14 +12365,14 @@
               <a:t>comments</a:t>
             </a:r>
             <a:r>
-              <a:rPr lang="it-IT">
+              <a:rPr lang="it-IT" dirty="0">
                 <a:latin typeface="Arial"/>
                 <a:ea typeface="+mn-lt"/>
                 <a:cs typeface="+mn-lt"/>
               </a:rPr>
               <a:t> and ratings on board games.</a:t>
             </a:r>
-            <a:endParaRPr lang="it-IT">
+            <a:endParaRPr lang="it-IT" dirty="0">
               <a:latin typeface="Arial"/>
               <a:cs typeface="Arial"/>
             </a:endParaRPr>
@@ -12422,7 +12383,7 @@
               <a:buChar char="•"/>
             </a:pPr>
             <a:r>
-              <a:rPr lang="it-IT" b="1">
+              <a:rPr lang="it-IT" b="1" dirty="0">
                 <a:latin typeface="Arial"/>
                 <a:ea typeface="+mn-lt"/>
                 <a:cs typeface="+mn-lt"/>
@@ -12430,7 +12391,7 @@
               <a:t>Track personal </a:t>
             </a:r>
             <a:r>
-              <a:rPr lang="it-IT" b="1" err="1">
+              <a:rPr lang="it-IT" b="1" dirty="0" err="1">
                 <a:latin typeface="Arial"/>
                 <a:ea typeface="+mn-lt"/>
                 <a:cs typeface="+mn-lt"/>
@@ -12438,7 +12399,7 @@
               <a:t>statistics</a:t>
             </a:r>
             <a:r>
-              <a:rPr lang="it-IT">
+              <a:rPr lang="it-IT" dirty="0">
                 <a:latin typeface="Arial"/>
                 <a:ea typeface="+mn-lt"/>
                 <a:cs typeface="+mn-lt"/>
@@ -12446,7 +12407,7 @@
               <a:t> </a:t>
             </a:r>
             <a:r>
-              <a:rPr lang="it-IT" err="1">
+              <a:rPr lang="it-IT" dirty="0" err="1">
                 <a:latin typeface="Arial"/>
                 <a:ea typeface="+mn-lt"/>
                 <a:cs typeface="+mn-lt"/>
@@ -12454,7 +12415,7 @@
               <a:t>such</a:t>
             </a:r>
             <a:r>
-              <a:rPr lang="it-IT">
+              <a:rPr lang="it-IT" dirty="0">
                 <a:latin typeface="Arial"/>
                 <a:ea typeface="+mn-lt"/>
                 <a:cs typeface="+mn-lt"/>
@@ -12462,7 +12423,7 @@
               <a:t> </a:t>
             </a:r>
             <a:r>
-              <a:rPr lang="it-IT" err="1">
+              <a:rPr lang="it-IT" dirty="0" err="1">
                 <a:latin typeface="Arial"/>
                 <a:ea typeface="+mn-lt"/>
                 <a:cs typeface="+mn-lt"/>
@@ -12470,7 +12431,7 @@
               <a:t>as</a:t>
             </a:r>
             <a:r>
-              <a:rPr lang="it-IT">
+              <a:rPr lang="it-IT" dirty="0">
                 <a:latin typeface="Arial"/>
                 <a:ea typeface="+mn-lt"/>
                 <a:cs typeface="+mn-lt"/>
@@ -12478,7 +12439,7 @@
               <a:t> games </a:t>
             </a:r>
             <a:r>
-              <a:rPr lang="it-IT" err="1">
+              <a:rPr lang="it-IT" dirty="0" err="1">
                 <a:latin typeface="Arial"/>
                 <a:ea typeface="+mn-lt"/>
                 <a:cs typeface="+mn-lt"/>
@@ -12486,7 +12447,7 @@
               <a:t>played</a:t>
             </a:r>
             <a:r>
-              <a:rPr lang="it-IT">
+              <a:rPr lang="it-IT" dirty="0">
                 <a:latin typeface="Arial"/>
                 <a:ea typeface="+mn-lt"/>
                 <a:cs typeface="+mn-lt"/>
@@ -12494,7 +12455,7 @@
               <a:t>, </a:t>
             </a:r>
             <a:r>
-              <a:rPr lang="it-IT" err="1">
+              <a:rPr lang="it-IT" dirty="0" err="1">
                 <a:latin typeface="Arial"/>
                 <a:ea typeface="+mn-lt"/>
                 <a:cs typeface="+mn-lt"/>
@@ -12502,14 +12463,14 @@
               <a:t>win</a:t>
             </a:r>
             <a:r>
-              <a:rPr lang="it-IT">
+              <a:rPr lang="it-IT" dirty="0">
                 <a:latin typeface="Arial"/>
                 <a:ea typeface="+mn-lt"/>
                 <a:cs typeface="+mn-lt"/>
               </a:rPr>
               <a:t> rates, and review activities.</a:t>
             </a:r>
-            <a:endParaRPr lang="it-IT">
+            <a:endParaRPr lang="it-IT" dirty="0">
               <a:latin typeface="Arial"/>
               <a:cs typeface="Arial"/>
             </a:endParaRPr>
@@ -12520,7 +12481,7 @@
               <a:buChar char="•"/>
             </a:pPr>
             <a:r>
-              <a:rPr lang="it-IT" b="1">
+              <a:rPr lang="it-IT" b="1" dirty="0">
                 <a:latin typeface="Arial"/>
                 <a:ea typeface="+mn-lt"/>
                 <a:cs typeface="+mn-lt"/>
@@ -12528,7 +12489,7 @@
               <a:t>For </a:t>
             </a:r>
             <a:r>
-              <a:rPr lang="it-IT" b="1" err="1">
+              <a:rPr lang="it-IT" b="1" dirty="0" err="1">
                 <a:latin typeface="Arial"/>
                 <a:ea typeface="+mn-lt"/>
                 <a:cs typeface="+mn-lt"/>
@@ -12536,7 +12497,7 @@
               <a:t>administrators</a:t>
             </a:r>
             <a:r>
-              <a:rPr lang="it-IT">
+              <a:rPr lang="it-IT" dirty="0">
                 <a:latin typeface="Arial"/>
                 <a:ea typeface="+mn-lt"/>
                 <a:cs typeface="+mn-lt"/>
@@ -12544,7 +12505,7 @@
               <a:t>, the </a:t>
             </a:r>
             <a:r>
-              <a:rPr lang="it-IT" err="1">
+              <a:rPr lang="it-IT" dirty="0" err="1">
                 <a:latin typeface="Arial"/>
                 <a:ea typeface="+mn-lt"/>
                 <a:cs typeface="+mn-lt"/>
@@ -12552,7 +12513,7 @@
               <a:t>application</a:t>
             </a:r>
             <a:r>
-              <a:rPr lang="it-IT">
+              <a:rPr lang="it-IT" dirty="0">
                 <a:latin typeface="Arial"/>
                 <a:ea typeface="+mn-lt"/>
                 <a:cs typeface="+mn-lt"/>
@@ -12560,7 +12521,7 @@
               <a:t> </a:t>
             </a:r>
             <a:r>
-              <a:rPr lang="it-IT" err="1">
+              <a:rPr lang="it-IT" dirty="0" err="1">
                 <a:latin typeface="Arial"/>
                 <a:ea typeface="+mn-lt"/>
                 <a:cs typeface="+mn-lt"/>
@@ -12568,7 +12529,7 @@
               <a:t>offers</a:t>
             </a:r>
             <a:r>
-              <a:rPr lang="it-IT">
+              <a:rPr lang="it-IT" dirty="0">
                 <a:latin typeface="Arial"/>
                 <a:ea typeface="+mn-lt"/>
                 <a:cs typeface="+mn-lt"/>
@@ -12576,7 +12537,7 @@
               <a:t> </a:t>
             </a:r>
             <a:r>
-              <a:rPr lang="it-IT" err="1">
+              <a:rPr lang="it-IT" dirty="0" err="1">
                 <a:latin typeface="Arial"/>
                 <a:ea typeface="+mn-lt"/>
                 <a:cs typeface="+mn-lt"/>
@@ -12584,7 +12545,7 @@
               <a:t>advanced</a:t>
             </a:r>
             <a:r>
-              <a:rPr lang="it-IT">
+              <a:rPr lang="it-IT" dirty="0">
                 <a:latin typeface="Arial"/>
                 <a:ea typeface="+mn-lt"/>
                 <a:cs typeface="+mn-lt"/>
@@ -12592,7 +12553,7 @@
               <a:t> </a:t>
             </a:r>
             <a:r>
-              <a:rPr lang="it-IT" err="1">
+              <a:rPr lang="it-IT" dirty="0" err="1">
                 <a:latin typeface="Arial"/>
                 <a:ea typeface="+mn-lt"/>
                 <a:cs typeface="+mn-lt"/>
@@ -12600,7 +12561,7 @@
               <a:t>analytics</a:t>
             </a:r>
             <a:r>
-              <a:rPr lang="it-IT">
+              <a:rPr lang="it-IT" dirty="0">
                 <a:latin typeface="Arial"/>
                 <a:ea typeface="+mn-lt"/>
                 <a:cs typeface="+mn-lt"/>
@@ -12608,7 +12569,7 @@
               <a:t> and the </a:t>
             </a:r>
             <a:r>
-              <a:rPr lang="it-IT" err="1">
+              <a:rPr lang="it-IT" dirty="0" err="1">
                 <a:latin typeface="Arial"/>
                 <a:ea typeface="+mn-lt"/>
                 <a:cs typeface="+mn-lt"/>
@@ -12616,7 +12577,7 @@
               <a:t>ability</a:t>
             </a:r>
             <a:r>
-              <a:rPr lang="it-IT">
+              <a:rPr lang="it-IT" dirty="0">
                 <a:latin typeface="Arial"/>
                 <a:ea typeface="+mn-lt"/>
                 <a:cs typeface="+mn-lt"/>
@@ -12624,7 +12585,7 @@
               <a:t> to </a:t>
             </a:r>
             <a:r>
-              <a:rPr lang="it-IT" err="1">
+              <a:rPr lang="it-IT" dirty="0" err="1">
                 <a:latin typeface="Arial"/>
                 <a:ea typeface="+mn-lt"/>
                 <a:cs typeface="+mn-lt"/>
@@ -12632,7 +12593,7 @@
               <a:t>manage</a:t>
             </a:r>
             <a:r>
-              <a:rPr lang="it-IT">
+              <a:rPr lang="it-IT" dirty="0">
                 <a:latin typeface="Arial"/>
                 <a:ea typeface="+mn-lt"/>
                 <a:cs typeface="+mn-lt"/>
@@ -12640,7 +12601,7 @@
               <a:t> user-</a:t>
             </a:r>
             <a:r>
-              <a:rPr lang="it-IT" err="1">
+              <a:rPr lang="it-IT" dirty="0" err="1">
                 <a:latin typeface="Arial"/>
                 <a:ea typeface="+mn-lt"/>
                 <a:cs typeface="+mn-lt"/>
@@ -12648,7 +12609,7 @@
               <a:t>generated</a:t>
             </a:r>
             <a:r>
-              <a:rPr lang="it-IT">
+              <a:rPr lang="it-IT" dirty="0">
                 <a:latin typeface="Arial"/>
                 <a:ea typeface="+mn-lt"/>
                 <a:cs typeface="+mn-lt"/>
@@ -12656,7 +12617,7 @@
               <a:t> data and </a:t>
             </a:r>
             <a:r>
-              <a:rPr lang="it-IT" err="1">
+              <a:rPr lang="it-IT" dirty="0" err="1">
                 <a:latin typeface="Arial"/>
                 <a:ea typeface="+mn-lt"/>
                 <a:cs typeface="+mn-lt"/>
@@ -12664,7 +12625,7 @@
               <a:t>perform</a:t>
             </a:r>
             <a:r>
-              <a:rPr lang="it-IT">
+              <a:rPr lang="it-IT" dirty="0">
                 <a:latin typeface="Arial"/>
                 <a:ea typeface="+mn-lt"/>
                 <a:cs typeface="+mn-lt"/>
@@ -12672,7 +12633,7 @@
               <a:t> </a:t>
             </a:r>
             <a:r>
-              <a:rPr lang="it-IT" err="1">
+              <a:rPr lang="it-IT" dirty="0" err="1">
                 <a:latin typeface="Arial"/>
                 <a:ea typeface="+mn-lt"/>
                 <a:cs typeface="+mn-lt"/>
@@ -12680,20 +12641,20 @@
               <a:t>specialized</a:t>
             </a:r>
             <a:r>
-              <a:rPr lang="it-IT">
+              <a:rPr lang="it-IT" dirty="0">
                 <a:latin typeface="Arial"/>
                 <a:ea typeface="+mn-lt"/>
                 <a:cs typeface="+mn-lt"/>
               </a:rPr>
               <a:t> queries.</a:t>
             </a:r>
-            <a:endParaRPr lang="it-IT">
+            <a:endParaRPr lang="it-IT" dirty="0">
               <a:latin typeface="Arial"/>
             </a:endParaRPr>
           </a:p>
           <a:p>
             <a:pPr algn="l"/>
-            <a:endParaRPr lang="it-IT">
+            <a:endParaRPr lang="it-IT" dirty="0">
               <a:ea typeface="Calibri"/>
               <a:cs typeface="Calibri"/>
             </a:endParaRPr>
@@ -17695,26 +17656,6 @@
 </file>
 
 <file path=customXml/item1.xml><?xml version="1.0" encoding="utf-8"?>
-<p:properties xmlns:p="http://schemas.microsoft.com/office/2006/metadata/properties" xmlns:xsi="http://www.w3.org/2001/XMLSchema-instance" xmlns:pc="http://schemas.microsoft.com/office/infopath/2007/PartnerControls">
-  <documentManagement>
-    <lcf76f155ced4ddcb4097134ff3c332f xmlns="616d0bdd-f7e5-4bcb-a053-1ce1cbb9450a">
-      <Terms xmlns="http://schemas.microsoft.com/office/infopath/2007/PartnerControls"/>
-    </lcf76f155ced4ddcb4097134ff3c332f>
-    <TaxCatchAll xmlns="9d27c991-df7d-42c7-a763-7353baa43f08" xsi:nil="true"/>
-  </documentManagement>
-</p:properties>
-</file>
-
-<file path=customXml/item2.xml><?xml version="1.0" encoding="utf-8"?>
-<?mso-contentType ?>
-<FormTemplates xmlns="http://schemas.microsoft.com/sharepoint/v3/contenttype/forms">
-  <Display>DocumentLibraryForm</Display>
-  <Edit>DocumentLibraryForm</Edit>
-  <New>DocumentLibraryForm</New>
-</FormTemplates>
-</file>
-
-<file path=customXml/item3.xml><?xml version="1.0" encoding="utf-8"?>
 <ct:contentTypeSchema xmlns:ct="http://schemas.microsoft.com/office/2006/metadata/contentType" xmlns:ma="http://schemas.microsoft.com/office/2006/metadata/properties/metaAttributes" ct:_="" ma:_="" ma:contentTypeName="Document" ma:contentTypeID="0x01010086483A18CC3AF84B8033AB64B742B40F" ma:contentTypeVersion="11" ma:contentTypeDescription="Create a new document." ma:contentTypeScope="" ma:versionID="989d3e8a56a20ecec4612e6ab221ee7a">
   <xsd:schema xmlns:xsd="http://www.w3.org/2001/XMLSchema" xmlns:xs="http://www.w3.org/2001/XMLSchema" xmlns:p="http://schemas.microsoft.com/office/2006/metadata/properties" xmlns:ns2="616d0bdd-f7e5-4bcb-a053-1ce1cbb9450a" xmlns:ns3="9d27c991-df7d-42c7-a763-7353baa43f08" targetNamespace="http://schemas.microsoft.com/office/2006/metadata/properties" ma:root="true" ma:fieldsID="14413cb0a4589dacb6618119336e95fa" ns2:_="" ns3:_="">
     <xsd:import namespace="616d0bdd-f7e5-4bcb-a053-1ce1cbb9450a"/>
@@ -17909,32 +17850,27 @@
 </ct:contentTypeSchema>
 </file>
 
-<file path=customXml/itemProps1.xml><?xml version="1.0" encoding="utf-8"?>
-<ds:datastoreItem xmlns:ds="http://schemas.openxmlformats.org/officeDocument/2006/customXml" ds:itemID="{EBC9B3D0-5A4D-4B8C-91D5-B142398A68C3}">
-  <ds:schemaRefs>
-    <ds:schemaRef ds:uri="616d0bdd-f7e5-4bcb-a053-1ce1cbb9450a"/>
-    <ds:schemaRef ds:uri="9d27c991-df7d-42c7-a763-7353baa43f08"/>
-    <ds:schemaRef ds:uri="http://purl.org/dc/dcmitype/"/>
-    <ds:schemaRef ds:uri="http://purl.org/dc/elements/1.1/"/>
-    <ds:schemaRef ds:uri="http://purl.org/dc/terms/"/>
-    <ds:schemaRef ds:uri="http://schemas.microsoft.com/office/2006/documentManagement/types"/>
-    <ds:schemaRef ds:uri="http://schemas.microsoft.com/office/2006/metadata/properties"/>
-    <ds:schemaRef ds:uri="http://schemas.microsoft.com/office/infopath/2007/PartnerControls"/>
-    <ds:schemaRef ds:uri="http://schemas.openxmlformats.org/package/2006/metadata/core-properties"/>
-    <ds:schemaRef ds:uri="http://www.w3.org/XML/1998/namespace"/>
-  </ds:schemaRefs>
-</ds:datastoreItem>
+<file path=customXml/item2.xml><?xml version="1.0" encoding="utf-8"?>
+<?mso-contentType ?>
+<FormTemplates xmlns="http://schemas.microsoft.com/sharepoint/v3/contenttype/forms">
+  <Display>DocumentLibraryForm</Display>
+  <Edit>DocumentLibraryForm</Edit>
+  <New>DocumentLibraryForm</New>
+</FormTemplates>
 </file>
 
-<file path=customXml/itemProps2.xml><?xml version="1.0" encoding="utf-8"?>
-<ds:datastoreItem xmlns:ds="http://schemas.openxmlformats.org/officeDocument/2006/customXml" ds:itemID="{6F4B22EF-8CF1-40D2-8ECB-2575A218BD4B}">
-  <ds:schemaRefs>
-    <ds:schemaRef ds:uri="http://schemas.microsoft.com/sharepoint/v3/contenttype/forms"/>
-  </ds:schemaRefs>
-</ds:datastoreItem>
+<file path=customXml/item3.xml><?xml version="1.0" encoding="utf-8"?>
+<p:properties xmlns:p="http://schemas.microsoft.com/office/2006/metadata/properties" xmlns:xsi="http://www.w3.org/2001/XMLSchema-instance" xmlns:pc="http://schemas.microsoft.com/office/infopath/2007/PartnerControls">
+  <documentManagement>
+    <lcf76f155ced4ddcb4097134ff3c332f xmlns="616d0bdd-f7e5-4bcb-a053-1ce1cbb9450a">
+      <Terms xmlns="http://schemas.microsoft.com/office/infopath/2007/PartnerControls"/>
+    </lcf76f155ced4ddcb4097134ff3c332f>
+    <TaxCatchAll xmlns="9d27c991-df7d-42c7-a763-7353baa43f08" xsi:nil="true"/>
+  </documentManagement>
+</p:properties>
 </file>
 
-<file path=customXml/itemProps3.xml><?xml version="1.0" encoding="utf-8"?>
+<file path=customXml/itemProps1.xml><?xml version="1.0" encoding="utf-8"?>
 <ds:datastoreItem xmlns:ds="http://schemas.openxmlformats.org/officeDocument/2006/customXml" ds:itemID="{6983F7D5-E4B8-4F7F-847B-C7282C8C43DE}">
   <ds:schemaRefs>
     <ds:schemaRef ds:uri="616d0bdd-f7e5-4bcb-a053-1ce1cbb9450a"/>
@@ -17951,4 +17887,29 @@
     <ds:schemaRef ds:uri="http://www.w3.org/2001/XMLSchema"/>
   </ds:schemaRefs>
 </ds:datastoreItem>
+</file>
+
+<file path=customXml/itemProps2.xml><?xml version="1.0" encoding="utf-8"?>
+<ds:datastoreItem xmlns:ds="http://schemas.openxmlformats.org/officeDocument/2006/customXml" ds:itemID="{6F4B22EF-8CF1-40D2-8ECB-2575A218BD4B}">
+  <ds:schemaRefs>
+    <ds:schemaRef ds:uri="http://schemas.microsoft.com/sharepoint/v3/contenttype/forms"/>
+  </ds:schemaRefs>
+</ds:datastoreItem>
+</file>
+
+<file path=customXml/itemProps3.xml><?xml version="1.0" encoding="utf-8"?>
+<ds:datastoreItem xmlns:ds="http://schemas.openxmlformats.org/officeDocument/2006/customXml" ds:itemID="{EBC9B3D0-5A4D-4B8C-91D5-B142398A68C3}">
+  <ds:schemaRefs>
+    <ds:schemaRef ds:uri="616d0bdd-f7e5-4bcb-a053-1ce1cbb9450a"/>
+    <ds:schemaRef ds:uri="9d27c991-df7d-42c7-a763-7353baa43f08"/>
+    <ds:schemaRef ds:uri="http://purl.org/dc/dcmitype/"/>
+    <ds:schemaRef ds:uri="http://purl.org/dc/elements/1.1/"/>
+    <ds:schemaRef ds:uri="http://purl.org/dc/terms/"/>
+    <ds:schemaRef ds:uri="http://schemas.microsoft.com/office/2006/documentManagement/types"/>
+    <ds:schemaRef ds:uri="http://schemas.microsoft.com/office/2006/metadata/properties"/>
+    <ds:schemaRef ds:uri="http://schemas.microsoft.com/office/infopath/2007/PartnerControls"/>
+    <ds:schemaRef ds:uri="http://schemas.openxmlformats.org/package/2006/metadata/core-properties"/>
+    <ds:schemaRef ds:uri="http://www.w3.org/XML/1998/namespace"/>
+  </ds:schemaRefs>
+</ds:datastoreItem>
 </file>
</xml_diff>

<commit_message>
change of the presentation
</commit_message>
<xml_diff>
--- a/docs/LSMSD_Presentation.pptx
+++ b/docs/LSMSD_Presentation.pptx
@@ -1742,6 +1742,38 @@
     </pc:docChg>
   </pc:docChgLst>
   <pc:docChgLst>
+    <pc:chgData name="Gabriele Silano" userId="S::g.silano@studenti.unipi.it::583ecce5-1896-4724-8d68-db413e846967" providerId="AD" clId="Web-{4D9DD04B-15C3-4608-B66B-45C6C402E964}"/>
+    <pc:docChg chg="modSld">
+      <pc:chgData name="Gabriele Silano" userId="S::g.silano@studenti.unipi.it::583ecce5-1896-4724-8d68-db413e846967" providerId="AD" clId="Web-{4D9DD04B-15C3-4608-B66B-45C6C402E964}" dt="2024-09-13T10:32:18.878" v="2" actId="1076"/>
+      <pc:docMkLst>
+        <pc:docMk/>
+      </pc:docMkLst>
+      <pc:sldChg chg="addSp delSp modSp">
+        <pc:chgData name="Gabriele Silano" userId="S::g.silano@studenti.unipi.it::583ecce5-1896-4724-8d68-db413e846967" providerId="AD" clId="Web-{4D9DD04B-15C3-4608-B66B-45C6C402E964}" dt="2024-09-13T10:32:18.878" v="2" actId="1076"/>
+        <pc:sldMkLst>
+          <pc:docMk/>
+          <pc:sldMk cId="1793239490" sldId="268"/>
+        </pc:sldMkLst>
+        <pc:picChg chg="del">
+          <ac:chgData name="Gabriele Silano" userId="S::g.silano@studenti.unipi.it::583ecce5-1896-4724-8d68-db413e846967" providerId="AD" clId="Web-{4D9DD04B-15C3-4608-B66B-45C6C402E964}" dt="2024-09-13T10:31:59.502" v="0"/>
+          <ac:picMkLst>
+            <pc:docMk/>
+            <pc:sldMk cId="1793239490" sldId="268"/>
+            <ac:picMk id="13" creationId="{B72D04AA-65F1-83C2-C852-9567D1C56136}"/>
+          </ac:picMkLst>
+        </pc:picChg>
+        <pc:picChg chg="add mod">
+          <ac:chgData name="Gabriele Silano" userId="S::g.silano@studenti.unipi.it::583ecce5-1896-4724-8d68-db413e846967" providerId="AD" clId="Web-{4D9DD04B-15C3-4608-B66B-45C6C402E964}" dt="2024-09-13T10:32:18.878" v="2" actId="1076"/>
+          <ac:picMkLst>
+            <pc:docMk/>
+            <pc:sldMk cId="1793239490" sldId="268"/>
+            <ac:picMk id="16" creationId="{7C207705-A153-97D7-B307-8754EC94E1D3}"/>
+          </ac:picMkLst>
+        </pc:picChg>
+      </pc:sldChg>
+    </pc:docChg>
+  </pc:docChgLst>
+  <pc:docChgLst>
     <pc:chgData name="Gabriele Silano" userId="S::g.silano@studenti.unipi.it::583ecce5-1896-4724-8d68-db413e846967" providerId="AD" clId="Web-{CB873A95-3FB4-4EBD-A867-6276B858300B}"/>
     <pc:docChg chg="modSld">
       <pc:chgData name="Gabriele Silano" userId="S::g.silano@studenti.unipi.it::583ecce5-1896-4724-8d68-db413e846967" providerId="AD" clId="Web-{CB873A95-3FB4-4EBD-A867-6276B858300B}" dt="2024-09-09T18:15:34.756" v="29" actId="20577"/>
@@ -1808,38 +1840,6 @@
             <ac:spMk id="3" creationId="{8E519C60-04A0-F8C4-2DE1-C6B12FAD28C9}"/>
           </ac:spMkLst>
         </pc:spChg>
-      </pc:sldChg>
-    </pc:docChg>
-  </pc:docChgLst>
-  <pc:docChgLst>
-    <pc:chgData name="Gabriele Silano" userId="S::g.silano@studenti.unipi.it::583ecce5-1896-4724-8d68-db413e846967" providerId="AD" clId="Web-{4D9DD04B-15C3-4608-B66B-45C6C402E964}"/>
-    <pc:docChg chg="modSld">
-      <pc:chgData name="Gabriele Silano" userId="S::g.silano@studenti.unipi.it::583ecce5-1896-4724-8d68-db413e846967" providerId="AD" clId="Web-{4D9DD04B-15C3-4608-B66B-45C6C402E964}" dt="2024-09-13T10:32:18.878" v="2" actId="1076"/>
-      <pc:docMkLst>
-        <pc:docMk/>
-      </pc:docMkLst>
-      <pc:sldChg chg="addSp delSp modSp">
-        <pc:chgData name="Gabriele Silano" userId="S::g.silano@studenti.unipi.it::583ecce5-1896-4724-8d68-db413e846967" providerId="AD" clId="Web-{4D9DD04B-15C3-4608-B66B-45C6C402E964}" dt="2024-09-13T10:32:18.878" v="2" actId="1076"/>
-        <pc:sldMkLst>
-          <pc:docMk/>
-          <pc:sldMk cId="1793239490" sldId="268"/>
-        </pc:sldMkLst>
-        <pc:picChg chg="del">
-          <ac:chgData name="Gabriele Silano" userId="S::g.silano@studenti.unipi.it::583ecce5-1896-4724-8d68-db413e846967" providerId="AD" clId="Web-{4D9DD04B-15C3-4608-B66B-45C6C402E964}" dt="2024-09-13T10:31:59.502" v="0"/>
-          <ac:picMkLst>
-            <pc:docMk/>
-            <pc:sldMk cId="1793239490" sldId="268"/>
-            <ac:picMk id="13" creationId="{B72D04AA-65F1-83C2-C852-9567D1C56136}"/>
-          </ac:picMkLst>
-        </pc:picChg>
-        <pc:picChg chg="add mod">
-          <ac:chgData name="Gabriele Silano" userId="S::g.silano@studenti.unipi.it::583ecce5-1896-4724-8d68-db413e846967" providerId="AD" clId="Web-{4D9DD04B-15C3-4608-B66B-45C6C402E964}" dt="2024-09-13T10:32:18.878" v="2" actId="1076"/>
-          <ac:picMkLst>
-            <pc:docMk/>
-            <pc:sldMk cId="1793239490" sldId="268"/>
-            <ac:picMk id="16" creationId="{7C207705-A153-97D7-B307-8754EC94E1D3}"/>
-          </ac:picMkLst>
-        </pc:picChg>
       </pc:sldChg>
     </pc:docChg>
   </pc:docChgLst>
@@ -13873,8 +13873,8 @@
         </p:nvSpPr>
         <p:spPr>
           <a:xfrm>
-            <a:off x="737419" y="1536174"/>
-            <a:ext cx="6764594" cy="3785652"/>
+            <a:off x="619432" y="1955426"/>
+            <a:ext cx="6764594" cy="3477875"/>
           </a:xfrm>
           <a:prstGeom prst="rect">
             <a:avLst/>
@@ -13904,7 +13904,7 @@
               <a:tabLst/>
             </a:pPr>
             <a:r>
-              <a:rPr kumimoji="0" lang="it-IT" altLang="it-IT" sz="2000" b="0" i="0" u="none" strike="noStrike" cap="none" normalizeH="0" baseline="0">
+              <a:rPr kumimoji="0" lang="it-IT" altLang="it-IT" sz="2000" b="0" i="0" u="none" strike="noStrike" cap="none" normalizeH="0" baseline="0" dirty="0">
                 <a:ln>
                   <a:noFill/>
                 </a:ln>
@@ -13917,7 +13917,7 @@
               <a:t>Web </a:t>
             </a:r>
             <a:r>
-              <a:rPr kumimoji="0" lang="it-IT" altLang="it-IT" sz="2000" b="0" i="0" u="none" strike="noStrike" cap="none" normalizeH="0" baseline="0" err="1">
+              <a:rPr kumimoji="0" lang="it-IT" altLang="it-IT" sz="2000" b="0" i="0" u="none" strike="noStrike" cap="none" normalizeH="0" baseline="0" dirty="0" err="1">
                 <a:ln>
                   <a:noFill/>
                 </a:ln>
@@ -13930,7 +13930,7 @@
               <a:t>application</a:t>
             </a:r>
             <a:r>
-              <a:rPr kumimoji="0" lang="it-IT" altLang="it-IT" sz="2000" b="0" i="0" u="none" strike="noStrike" cap="none" normalizeH="0" baseline="0">
+              <a:rPr kumimoji="0" lang="it-IT" altLang="it-IT" sz="2000" b="0" i="0" u="none" strike="noStrike" cap="none" normalizeH="0" baseline="0" dirty="0">
                 <a:ln>
                   <a:noFill/>
                 </a:ln>
@@ -13943,7 +13943,7 @@
               <a:t> </a:t>
             </a:r>
             <a:r>
-              <a:rPr kumimoji="0" lang="it-IT" altLang="it-IT" sz="2000" b="0" i="0" u="none" strike="noStrike" cap="none" normalizeH="0" baseline="0" err="1">
+              <a:rPr kumimoji="0" lang="it-IT" altLang="it-IT" sz="2000" b="0" i="0" u="none" strike="noStrike" cap="none" normalizeH="0" baseline="0" dirty="0" err="1">
                 <a:ln>
                   <a:noFill/>
                 </a:ln>
@@ -13955,7 +13955,7 @@
               </a:rPr>
               <a:t>implementation</a:t>
             </a:r>
-            <a:endParaRPr kumimoji="0" lang="it-IT" altLang="it-IT" sz="2000" b="0" i="0" u="none" strike="noStrike" cap="none" normalizeH="0" baseline="0">
+            <a:endParaRPr kumimoji="0" lang="it-IT" altLang="it-IT" sz="2000" b="0" i="0" u="none" strike="noStrike" cap="none" normalizeH="0" baseline="0" dirty="0">
               <a:ln>
                 <a:noFill/>
               </a:ln>
@@ -13983,7 +13983,7 @@
               <a:buChar char="•"/>
               <a:tabLst/>
             </a:pPr>
-            <a:endParaRPr kumimoji="0" lang="it-IT" altLang="it-IT" sz="2000" b="0" i="0" u="none" strike="noStrike" cap="none" normalizeH="0" baseline="0">
+            <a:endParaRPr kumimoji="0" lang="it-IT" altLang="it-IT" sz="2000" b="0" i="0" u="none" strike="noStrike" cap="none" normalizeH="0" baseline="0" dirty="0">
               <a:ln>
                 <a:noFill/>
               </a:ln>
@@ -14012,7 +14012,7 @@
               <a:tabLst/>
             </a:pPr>
             <a:r>
-              <a:rPr kumimoji="0" lang="it-IT" altLang="it-IT" sz="2000" b="0" i="0" u="none" strike="noStrike" cap="none" normalizeH="0" baseline="0">
+              <a:rPr kumimoji="0" lang="it-IT" altLang="it-IT" sz="2000" b="0" i="0" u="none" strike="noStrike" cap="none" normalizeH="0" baseline="0" dirty="0">
                 <a:ln>
                   <a:noFill/>
                 </a:ln>
@@ -14025,7 +14025,7 @@
               <a:t>High </a:t>
             </a:r>
             <a:r>
-              <a:rPr kumimoji="0" lang="it-IT" altLang="it-IT" sz="2000" b="0" i="0" u="none" strike="noStrike" cap="none" normalizeH="0" baseline="0" err="1">
+              <a:rPr kumimoji="0" lang="it-IT" altLang="it-IT" sz="2000" b="0" i="0" u="none" strike="noStrike" cap="none" normalizeH="0" baseline="0" dirty="0" err="1">
                 <a:ln>
                   <a:noFill/>
                 </a:ln>
@@ -14038,7 +14038,7 @@
               <a:t>availability</a:t>
             </a:r>
             <a:r>
-              <a:rPr kumimoji="0" lang="it-IT" altLang="it-IT" sz="2000" b="0" i="0" u="none" strike="noStrike" cap="none" normalizeH="0" baseline="0">
+              <a:rPr kumimoji="0" lang="it-IT" altLang="it-IT" sz="2000" b="0" i="0" u="none" strike="noStrike" cap="none" normalizeH="0" baseline="0" dirty="0">
                 <a:ln>
                   <a:noFill/>
                 </a:ln>
@@ -14051,7 +14051,7 @@
               <a:t> to </a:t>
             </a:r>
             <a:r>
-              <a:rPr kumimoji="0" lang="it-IT" altLang="it-IT" sz="2000" b="0" i="0" u="none" strike="noStrike" cap="none" normalizeH="0" baseline="0" err="1">
+              <a:rPr kumimoji="0" lang="it-IT" altLang="it-IT" sz="2000" b="0" i="0" u="none" strike="noStrike" cap="none" normalizeH="0" baseline="0" dirty="0" err="1">
                 <a:ln>
                   <a:noFill/>
                 </a:ln>
@@ -14064,7 +14064,7 @@
               <a:t>ensure</a:t>
             </a:r>
             <a:r>
-              <a:rPr kumimoji="0" lang="it-IT" altLang="it-IT" sz="2000" b="0" i="0" u="none" strike="noStrike" cap="none" normalizeH="0" baseline="0">
+              <a:rPr kumimoji="0" lang="it-IT" altLang="it-IT" sz="2000" b="0" i="0" u="none" strike="noStrike" cap="none" normalizeH="0" baseline="0" dirty="0">
                 <a:ln>
                   <a:noFill/>
                 </a:ln>
@@ -14077,7 +14077,7 @@
               <a:t> </a:t>
             </a:r>
             <a:r>
-              <a:rPr kumimoji="0" lang="it-IT" altLang="it-IT" sz="2000" b="0" i="0" u="none" strike="noStrike" cap="none" normalizeH="0" baseline="0" err="1">
+              <a:rPr kumimoji="0" lang="it-IT" altLang="it-IT" sz="2000" b="0" i="0" u="none" strike="noStrike" cap="none" normalizeH="0" baseline="0" dirty="0" err="1">
                 <a:ln>
                   <a:noFill/>
                 </a:ln>
@@ -14090,7 +14090,7 @@
               <a:t>uninterrupted</a:t>
             </a:r>
             <a:r>
-              <a:rPr kumimoji="0" lang="it-IT" altLang="it-IT" sz="2000" b="0" i="0" u="none" strike="noStrike" cap="none" normalizeH="0" baseline="0">
+              <a:rPr kumimoji="0" lang="it-IT" altLang="it-IT" sz="2000" b="0" i="0" u="none" strike="noStrike" cap="none" normalizeH="0" baseline="0" dirty="0">
                 <a:ln>
                   <a:noFill/>
                 </a:ln>
@@ -14120,7 +14120,7 @@
               <a:buChar char="•"/>
               <a:tabLst/>
             </a:pPr>
-            <a:endParaRPr kumimoji="0" lang="it-IT" altLang="it-IT" sz="2000" b="0" i="0" u="none" strike="noStrike" cap="none" normalizeH="0" baseline="0">
+            <a:endParaRPr kumimoji="0" lang="it-IT" altLang="it-IT" sz="2000" b="0" i="0" u="none" strike="noStrike" cap="none" normalizeH="0" baseline="0" dirty="0">
               <a:ln>
                 <a:noFill/>
               </a:ln>
@@ -14149,7 +14149,7 @@
               <a:tabLst/>
             </a:pPr>
             <a:r>
-              <a:rPr kumimoji="0" lang="it-IT" altLang="it-IT" sz="2000" b="0" i="0" u="none" strike="noStrike" cap="none" normalizeH="0" baseline="0">
+              <a:rPr kumimoji="0" lang="it-IT" altLang="it-IT" sz="2000" b="0" i="0" u="none" strike="noStrike" cap="none" normalizeH="0" baseline="0" dirty="0">
                 <a:ln>
                   <a:noFill/>
                 </a:ln>
@@ -14162,7 +14162,7 @@
               <a:t>Object-</a:t>
             </a:r>
             <a:r>
-              <a:rPr kumimoji="0" lang="it-IT" altLang="it-IT" sz="2000" b="0" i="0" u="none" strike="noStrike" cap="none" normalizeH="0" baseline="0" err="1">
+              <a:rPr kumimoji="0" lang="it-IT" altLang="it-IT" sz="2000" b="0" i="0" u="none" strike="noStrike" cap="none" normalizeH="0" baseline="0" dirty="0" err="1">
                 <a:ln>
                   <a:noFill/>
                 </a:ln>
@@ -14175,7 +14175,7 @@
               <a:t>oriented</a:t>
             </a:r>
             <a:r>
-              <a:rPr kumimoji="0" lang="it-IT" altLang="it-IT" sz="2000" b="0" i="0" u="none" strike="noStrike" cap="none" normalizeH="0" baseline="0">
+              <a:rPr kumimoji="0" lang="it-IT" altLang="it-IT" sz="2000" b="0" i="0" u="none" strike="noStrike" cap="none" normalizeH="0" baseline="0" dirty="0">
                 <a:ln>
                   <a:noFill/>
                 </a:ln>
@@ -14188,7 +14188,7 @@
               <a:t> programming for code </a:t>
             </a:r>
             <a:r>
-              <a:rPr kumimoji="0" lang="it-IT" altLang="it-IT" sz="2000" b="0" i="0" u="none" strike="noStrike" cap="none" normalizeH="0" baseline="0" err="1">
+              <a:rPr kumimoji="0" lang="it-IT" altLang="it-IT" sz="2000" b="0" i="0" u="none" strike="noStrike" cap="none" normalizeH="0" baseline="0" dirty="0" err="1">
                 <a:ln>
                   <a:noFill/>
                 </a:ln>
@@ -14200,7 +14200,7 @@
               </a:rPr>
               <a:t>maintainability</a:t>
             </a:r>
-            <a:endParaRPr kumimoji="0" lang="it-IT" altLang="it-IT" sz="2000" b="0" i="0" u="none" strike="noStrike" cap="none" normalizeH="0" baseline="0">
+            <a:endParaRPr kumimoji="0" lang="it-IT" altLang="it-IT" sz="2000" b="0" i="0" u="none" strike="noStrike" cap="none" normalizeH="0" baseline="0" dirty="0">
               <a:ln>
                 <a:noFill/>
               </a:ln>
@@ -14228,7 +14228,7 @@
               <a:buChar char="•"/>
               <a:tabLst/>
             </a:pPr>
-            <a:endParaRPr kumimoji="0" lang="it-IT" altLang="it-IT" sz="2000" b="0" i="0" u="none" strike="noStrike" cap="none" normalizeH="0" baseline="0">
+            <a:endParaRPr kumimoji="0" lang="it-IT" altLang="it-IT" sz="2000" b="0" i="0" u="none" strike="noStrike" cap="none" normalizeH="0" baseline="0" dirty="0">
               <a:ln>
                 <a:noFill/>
               </a:ln>
@@ -14257,7 +14257,7 @@
               <a:tabLst/>
             </a:pPr>
             <a:r>
-              <a:rPr kumimoji="0" lang="it-IT" altLang="it-IT" sz="2000" b="0" i="0" u="none" strike="noStrike" cap="none" normalizeH="0" baseline="0" err="1">
+              <a:rPr kumimoji="0" lang="it-IT" altLang="it-IT" sz="2000" b="0" i="0" u="none" strike="noStrike" cap="none" normalizeH="0" baseline="0" dirty="0" err="1">
                 <a:ln>
                   <a:noFill/>
                 </a:ln>
@@ -14270,7 +14270,7 @@
               <a:t>Encryption</a:t>
             </a:r>
             <a:r>
-              <a:rPr kumimoji="0" lang="it-IT" altLang="it-IT" sz="2000" b="0" i="0" u="none" strike="noStrike" cap="none" normalizeH="0" baseline="0">
+              <a:rPr kumimoji="0" lang="it-IT" altLang="it-IT" sz="2000" b="0" i="0" u="none" strike="noStrike" cap="none" normalizeH="0" baseline="0" dirty="0">
                 <a:ln>
                   <a:noFill/>
                 </a:ln>
@@ -14300,7 +14300,7 @@
               <a:buChar char="•"/>
               <a:tabLst/>
             </a:pPr>
-            <a:endParaRPr kumimoji="0" lang="it-IT" altLang="it-IT" sz="2000" b="0" i="0" u="none" strike="noStrike" cap="none" normalizeH="0" baseline="0">
+            <a:endParaRPr kumimoji="0" lang="it-IT" altLang="it-IT" sz="2000" b="0" i="0" u="none" strike="noStrike" cap="none" normalizeH="0" baseline="0" dirty="0">
               <a:ln>
                 <a:noFill/>
               </a:ln>
@@ -14329,7 +14329,7 @@
               <a:tabLst/>
             </a:pPr>
             <a:r>
-              <a:rPr kumimoji="0" lang="it-IT" altLang="it-IT" sz="2000" b="0" i="0" u="none" strike="noStrike" cap="none" normalizeH="0" baseline="0" err="1">
+              <a:rPr kumimoji="0" lang="it-IT" altLang="it-IT" sz="2000" b="0" i="0" u="none" strike="noStrike" cap="none" normalizeH="0" baseline="0" dirty="0" err="1">
                 <a:ln>
                   <a:noFill/>
                 </a:ln>
@@ -14342,7 +14342,7 @@
               <a:t>Scalability</a:t>
             </a:r>
             <a:r>
-              <a:rPr kumimoji="0" lang="it-IT" altLang="it-IT" sz="2000" b="0" i="0" u="none" strike="noStrike" cap="none" normalizeH="0" baseline="0">
+              <a:rPr kumimoji="0" lang="it-IT" altLang="it-IT" sz="2000" b="0" i="0" u="none" strike="noStrike" cap="none" normalizeH="0" baseline="0" dirty="0">
                 <a:ln>
                   <a:noFill/>
                 </a:ln>
@@ -14355,7 +14355,7 @@
               <a:t> to support </a:t>
             </a:r>
             <a:r>
-              <a:rPr kumimoji="0" lang="it-IT" altLang="it-IT" sz="2000" b="0" i="0" u="none" strike="noStrike" cap="none" normalizeH="0" baseline="0" err="1">
+              <a:rPr kumimoji="0" lang="it-IT" altLang="it-IT" sz="2000" b="0" i="0" u="none" strike="noStrike" cap="none" normalizeH="0" baseline="0" dirty="0" err="1">
                 <a:ln>
                   <a:noFill/>
                 </a:ln>
@@ -14368,7 +14368,7 @@
               <a:t>increasing</a:t>
             </a:r>
             <a:r>
-              <a:rPr kumimoji="0" lang="it-IT" altLang="it-IT" sz="2000" b="0" i="0" u="none" strike="noStrike" cap="none" normalizeH="0" baseline="0">
+              <a:rPr kumimoji="0" lang="it-IT" altLang="it-IT" sz="2000" b="0" i="0" u="none" strike="noStrike" cap="none" normalizeH="0" baseline="0" dirty="0">
                 <a:ln>
                   <a:noFill/>
                 </a:ln>
@@ -14381,7 +14381,7 @@
               <a:t> loads and databases </a:t>
             </a:r>
             <a:r>
-              <a:rPr kumimoji="0" lang="it-IT" altLang="it-IT" sz="2000" b="0" i="0" u="none" strike="noStrike" cap="none" normalizeH="0" baseline="0" err="1">
+              <a:rPr kumimoji="0" lang="it-IT" altLang="it-IT" sz="2000" b="0" i="0" u="none" strike="noStrike" cap="none" normalizeH="0" baseline="0" dirty="0" err="1">
                 <a:ln>
                   <a:noFill/>
                 </a:ln>
@@ -14393,7 +14393,7 @@
               </a:rPr>
               <a:t>growth</a:t>
             </a:r>
-            <a:endParaRPr kumimoji="0" lang="it-IT" altLang="it-IT" sz="2000" b="0" i="0" u="none" strike="noStrike" cap="none" normalizeH="0" baseline="0">
+            <a:endParaRPr kumimoji="0" lang="it-IT" altLang="it-IT" sz="2000" b="0" i="0" u="none" strike="noStrike" cap="none" normalizeH="0" baseline="0" dirty="0">
               <a:ln>
                 <a:noFill/>
               </a:ln>
@@ -14405,7 +14405,7 @@
             </a:endParaRPr>
           </a:p>
           <a:p>
-            <a:pPr marL="342900" marR="0" lvl="0" indent="-342900" defTabSz="914400" rtl="0" eaLnBrk="0" fontAlgn="base" latinLnBrk="0" hangingPunct="0">
+            <a:pPr marR="0" lvl="0" defTabSz="914400" rtl="0" eaLnBrk="0" fontAlgn="base" latinLnBrk="0" hangingPunct="0">
               <a:lnSpc>
                 <a:spcPct val="100000"/>
               </a:lnSpc>
@@ -14417,92 +14417,10 @@
               </a:spcAft>
               <a:buClrTx/>
               <a:buSzTx/>
-              <a:buFont typeface="Arial" panose="020B0604020202020204" pitchFamily="34" charset="0"/>
-              <a:buChar char="•"/>
               <a:tabLst/>
             </a:pPr>
-            <a:endParaRPr kumimoji="0" lang="it-IT" altLang="it-IT" sz="2000" b="0" i="0" u="none" strike="noStrike" cap="none" normalizeH="0" baseline="0">
-              <a:ln>
-                <a:noFill/>
-              </a:ln>
-              <a:solidFill>
-                <a:schemeClr val="tx1"/>
-              </a:solidFill>
-              <a:effectLst/>
-              <a:latin typeface="Arial" panose="020B0604020202020204" pitchFamily="34" charset="0"/>
-            </a:endParaRPr>
-          </a:p>
-          <a:p>
-            <a:pPr marL="342900" marR="0" lvl="0" indent="-342900" defTabSz="914400" rtl="0" eaLnBrk="0" fontAlgn="base" latinLnBrk="0" hangingPunct="0">
-              <a:lnSpc>
-                <a:spcPct val="100000"/>
-              </a:lnSpc>
-              <a:spcBef>
-                <a:spcPct val="0"/>
-              </a:spcBef>
-              <a:spcAft>
-                <a:spcPct val="0"/>
-              </a:spcAft>
-              <a:buClrTx/>
-              <a:buSzTx/>
-              <a:buFont typeface="Arial" panose="020B0604020202020204" pitchFamily="34" charset="0"/>
-              <a:buChar char="•"/>
-              <a:tabLst/>
-            </a:pPr>
-            <a:r>
-              <a:rPr kumimoji="0" lang="it-IT" altLang="it-IT" sz="2000" b="0" i="0" u="none" strike="noStrike" cap="none" normalizeH="0" baseline="0">
-                <a:ln>
-                  <a:noFill/>
-                </a:ln>
-                <a:solidFill>
-                  <a:schemeClr val="tx1"/>
-                </a:solidFill>
-                <a:effectLst/>
-                <a:latin typeface="Arial" panose="020B0604020202020204" pitchFamily="34" charset="0"/>
-              </a:rPr>
-              <a:t>User-friendly </a:t>
-            </a:r>
-            <a:r>
-              <a:rPr kumimoji="0" lang="it-IT" altLang="it-IT" sz="2000" b="0" i="0" u="none" strike="noStrike" cap="none" normalizeH="0" baseline="0" err="1">
-                <a:ln>
-                  <a:noFill/>
-                </a:ln>
-                <a:solidFill>
-                  <a:schemeClr val="tx1"/>
-                </a:solidFill>
-                <a:effectLst/>
-                <a:latin typeface="Arial" panose="020B0604020202020204" pitchFamily="34" charset="0"/>
-              </a:rPr>
-              <a:t>interface</a:t>
-            </a:r>
-            <a:r>
-              <a:rPr kumimoji="0" lang="it-IT" altLang="it-IT" sz="2000" b="0" i="0" u="none" strike="noStrike" cap="none" normalizeH="0" baseline="0">
-                <a:ln>
-                  <a:noFill/>
-                </a:ln>
-                <a:solidFill>
-                  <a:schemeClr val="tx1"/>
-                </a:solidFill>
-                <a:effectLst/>
-                <a:latin typeface="Arial" panose="020B0604020202020204" pitchFamily="34" charset="0"/>
-              </a:rPr>
-              <a:t> for easy and intuitive </a:t>
-            </a:r>
-            <a:r>
-              <a:rPr kumimoji="0" lang="it-IT" altLang="it-IT" sz="2000" b="0" i="0" u="none" strike="noStrike" cap="none" normalizeH="0" baseline="0" err="1">
-                <a:ln>
-                  <a:noFill/>
-                </a:ln>
-                <a:solidFill>
-                  <a:schemeClr val="tx1"/>
-                </a:solidFill>
-                <a:effectLst/>
-                <a:latin typeface="Arial" panose="020B0604020202020204" pitchFamily="34" charset="0"/>
-              </a:rPr>
-              <a:t>navigation</a:t>
-            </a:r>
-            <a:r>
-              <a:rPr kumimoji="0" lang="it-IT" altLang="it-IT" sz="2000" b="0" i="0" u="none" strike="noStrike" cap="none" normalizeH="0" baseline="0">
+            <a:r>
+              <a:rPr kumimoji="0" lang="it-IT" altLang="it-IT" sz="2000" b="0" i="0" u="none" strike="noStrike" cap="none" normalizeH="0" baseline="0" dirty="0">
                 <a:ln>
                   <a:noFill/>
                 </a:ln>
@@ -17656,6 +17574,26 @@
 </file>
 
 <file path=customXml/item1.xml><?xml version="1.0" encoding="utf-8"?>
+<p:properties xmlns:p="http://schemas.microsoft.com/office/2006/metadata/properties" xmlns:xsi="http://www.w3.org/2001/XMLSchema-instance" xmlns:pc="http://schemas.microsoft.com/office/infopath/2007/PartnerControls">
+  <documentManagement>
+    <lcf76f155ced4ddcb4097134ff3c332f xmlns="616d0bdd-f7e5-4bcb-a053-1ce1cbb9450a">
+      <Terms xmlns="http://schemas.microsoft.com/office/infopath/2007/PartnerControls"/>
+    </lcf76f155ced4ddcb4097134ff3c332f>
+    <TaxCatchAll xmlns="9d27c991-df7d-42c7-a763-7353baa43f08" xsi:nil="true"/>
+  </documentManagement>
+</p:properties>
+</file>
+
+<file path=customXml/item2.xml><?xml version="1.0" encoding="utf-8"?>
+<?mso-contentType ?>
+<FormTemplates xmlns="http://schemas.microsoft.com/sharepoint/v3/contenttype/forms">
+  <Display>DocumentLibraryForm</Display>
+  <Edit>DocumentLibraryForm</Edit>
+  <New>DocumentLibraryForm</New>
+</FormTemplates>
+</file>
+
+<file path=customXml/item3.xml><?xml version="1.0" encoding="utf-8"?>
 <ct:contentTypeSchema xmlns:ct="http://schemas.microsoft.com/office/2006/metadata/contentType" xmlns:ma="http://schemas.microsoft.com/office/2006/metadata/properties/metaAttributes" ct:_="" ma:_="" ma:contentTypeName="Document" ma:contentTypeID="0x01010086483A18CC3AF84B8033AB64B742B40F" ma:contentTypeVersion="11" ma:contentTypeDescription="Create a new document." ma:contentTypeScope="" ma:versionID="989d3e8a56a20ecec4612e6ab221ee7a">
   <xsd:schema xmlns:xsd="http://www.w3.org/2001/XMLSchema" xmlns:xs="http://www.w3.org/2001/XMLSchema" xmlns:p="http://schemas.microsoft.com/office/2006/metadata/properties" xmlns:ns2="616d0bdd-f7e5-4bcb-a053-1ce1cbb9450a" xmlns:ns3="9d27c991-df7d-42c7-a763-7353baa43f08" targetNamespace="http://schemas.microsoft.com/office/2006/metadata/properties" ma:root="true" ma:fieldsID="14413cb0a4589dacb6618119336e95fa" ns2:_="" ns3:_="">
     <xsd:import namespace="616d0bdd-f7e5-4bcb-a053-1ce1cbb9450a"/>
@@ -17850,27 +17788,32 @@
 </ct:contentTypeSchema>
 </file>
 
-<file path=customXml/item2.xml><?xml version="1.0" encoding="utf-8"?>
-<?mso-contentType ?>
-<FormTemplates xmlns="http://schemas.microsoft.com/sharepoint/v3/contenttype/forms">
-  <Display>DocumentLibraryForm</Display>
-  <Edit>DocumentLibraryForm</Edit>
-  <New>DocumentLibraryForm</New>
-</FormTemplates>
+<file path=customXml/itemProps1.xml><?xml version="1.0" encoding="utf-8"?>
+<ds:datastoreItem xmlns:ds="http://schemas.openxmlformats.org/officeDocument/2006/customXml" ds:itemID="{EBC9B3D0-5A4D-4B8C-91D5-B142398A68C3}">
+  <ds:schemaRefs>
+    <ds:schemaRef ds:uri="616d0bdd-f7e5-4bcb-a053-1ce1cbb9450a"/>
+    <ds:schemaRef ds:uri="9d27c991-df7d-42c7-a763-7353baa43f08"/>
+    <ds:schemaRef ds:uri="http://purl.org/dc/dcmitype/"/>
+    <ds:schemaRef ds:uri="http://purl.org/dc/elements/1.1/"/>
+    <ds:schemaRef ds:uri="http://purl.org/dc/terms/"/>
+    <ds:schemaRef ds:uri="http://schemas.microsoft.com/office/2006/documentManagement/types"/>
+    <ds:schemaRef ds:uri="http://schemas.microsoft.com/office/2006/metadata/properties"/>
+    <ds:schemaRef ds:uri="http://schemas.microsoft.com/office/infopath/2007/PartnerControls"/>
+    <ds:schemaRef ds:uri="http://schemas.openxmlformats.org/package/2006/metadata/core-properties"/>
+    <ds:schemaRef ds:uri="http://www.w3.org/XML/1998/namespace"/>
+  </ds:schemaRefs>
+</ds:datastoreItem>
 </file>
 
-<file path=customXml/item3.xml><?xml version="1.0" encoding="utf-8"?>
-<p:properties xmlns:p="http://schemas.microsoft.com/office/2006/metadata/properties" xmlns:xsi="http://www.w3.org/2001/XMLSchema-instance" xmlns:pc="http://schemas.microsoft.com/office/infopath/2007/PartnerControls">
-  <documentManagement>
-    <lcf76f155ced4ddcb4097134ff3c332f xmlns="616d0bdd-f7e5-4bcb-a053-1ce1cbb9450a">
-      <Terms xmlns="http://schemas.microsoft.com/office/infopath/2007/PartnerControls"/>
-    </lcf76f155ced4ddcb4097134ff3c332f>
-    <TaxCatchAll xmlns="9d27c991-df7d-42c7-a763-7353baa43f08" xsi:nil="true"/>
-  </documentManagement>
-</p:properties>
+<file path=customXml/itemProps2.xml><?xml version="1.0" encoding="utf-8"?>
+<ds:datastoreItem xmlns:ds="http://schemas.openxmlformats.org/officeDocument/2006/customXml" ds:itemID="{6F4B22EF-8CF1-40D2-8ECB-2575A218BD4B}">
+  <ds:schemaRefs>
+    <ds:schemaRef ds:uri="http://schemas.microsoft.com/sharepoint/v3/contenttype/forms"/>
+  </ds:schemaRefs>
+</ds:datastoreItem>
 </file>
 
-<file path=customXml/itemProps1.xml><?xml version="1.0" encoding="utf-8"?>
+<file path=customXml/itemProps3.xml><?xml version="1.0" encoding="utf-8"?>
 <ds:datastoreItem xmlns:ds="http://schemas.openxmlformats.org/officeDocument/2006/customXml" ds:itemID="{6983F7D5-E4B8-4F7F-847B-C7282C8C43DE}">
   <ds:schemaRefs>
     <ds:schemaRef ds:uri="616d0bdd-f7e5-4bcb-a053-1ce1cbb9450a"/>
@@ -17887,29 +17830,4 @@
     <ds:schemaRef ds:uri="http://www.w3.org/2001/XMLSchema"/>
   </ds:schemaRefs>
 </ds:datastoreItem>
-</file>
-
-<file path=customXml/itemProps2.xml><?xml version="1.0" encoding="utf-8"?>
-<ds:datastoreItem xmlns:ds="http://schemas.openxmlformats.org/officeDocument/2006/customXml" ds:itemID="{6F4B22EF-8CF1-40D2-8ECB-2575A218BD4B}">
-  <ds:schemaRefs>
-    <ds:schemaRef ds:uri="http://schemas.microsoft.com/sharepoint/v3/contenttype/forms"/>
-  </ds:schemaRefs>
-</ds:datastoreItem>
-</file>
-
-<file path=customXml/itemProps3.xml><?xml version="1.0" encoding="utf-8"?>
-<ds:datastoreItem xmlns:ds="http://schemas.openxmlformats.org/officeDocument/2006/customXml" ds:itemID="{EBC9B3D0-5A4D-4B8C-91D5-B142398A68C3}">
-  <ds:schemaRefs>
-    <ds:schemaRef ds:uri="616d0bdd-f7e5-4bcb-a053-1ce1cbb9450a"/>
-    <ds:schemaRef ds:uri="9d27c991-df7d-42c7-a763-7353baa43f08"/>
-    <ds:schemaRef ds:uri="http://purl.org/dc/dcmitype/"/>
-    <ds:schemaRef ds:uri="http://purl.org/dc/elements/1.1/"/>
-    <ds:schemaRef ds:uri="http://purl.org/dc/terms/"/>
-    <ds:schemaRef ds:uri="http://schemas.microsoft.com/office/2006/documentManagement/types"/>
-    <ds:schemaRef ds:uri="http://schemas.microsoft.com/office/2006/metadata/properties"/>
-    <ds:schemaRef ds:uri="http://schemas.microsoft.com/office/infopath/2007/PartnerControls"/>
-    <ds:schemaRef ds:uri="http://schemas.openxmlformats.org/package/2006/metadata/core-properties"/>
-    <ds:schemaRef ds:uri="http://www.w3.org/XML/1998/namespace"/>
-  </ds:schemaRefs>
-</ds:datastoreItem>
 </file>
</xml_diff>